<commit_message>
Update GUI class diagrams
</commit_message>
<xml_diff>
--- a/Class UML diagrams/GUI.pptx
+++ b/Class UML diagrams/GUI.pptx
@@ -10,14 +10,14 @@
   <p:sldIdLst>
     <p:sldId id="257" r:id="rId2"/>
   </p:sldIdLst>
-  <p:sldSz cx="9144000" cy="6858000" type="screen4x3"/>
+  <p:sldSz cx="9144000" cy="5715000" type="screen16x10"/>
   <p:notesSz cx="6858000" cy="9144000"/>
   <p:defaultTextStyle>
     <a:defPPr>
       <a:defRPr lang="en-US"/>
     </a:defPPr>
-    <a:lvl1pPr marL="0" algn="l" defTabSz="457200" rtl="0" eaLnBrk="1" latinLnBrk="0" hangingPunct="1">
-      <a:defRPr sz="1800" kern="1200">
+    <a:lvl1pPr marL="0" algn="l" defTabSz="424508" rtl="0" eaLnBrk="1" latinLnBrk="0" hangingPunct="1">
+      <a:defRPr sz="1700" kern="1200">
         <a:solidFill>
           <a:schemeClr val="tx1"/>
         </a:solidFill>
@@ -26,8 +26,8 @@
         <a:cs typeface="+mn-cs"/>
       </a:defRPr>
     </a:lvl1pPr>
-    <a:lvl2pPr marL="457200" algn="l" defTabSz="457200" rtl="0" eaLnBrk="1" latinLnBrk="0" hangingPunct="1">
-      <a:defRPr sz="1800" kern="1200">
+    <a:lvl2pPr marL="424508" algn="l" defTabSz="424508" rtl="0" eaLnBrk="1" latinLnBrk="0" hangingPunct="1">
+      <a:defRPr sz="1700" kern="1200">
         <a:solidFill>
           <a:schemeClr val="tx1"/>
         </a:solidFill>
@@ -36,8 +36,8 @@
         <a:cs typeface="+mn-cs"/>
       </a:defRPr>
     </a:lvl2pPr>
-    <a:lvl3pPr marL="914400" algn="l" defTabSz="457200" rtl="0" eaLnBrk="1" latinLnBrk="0" hangingPunct="1">
-      <a:defRPr sz="1800" kern="1200">
+    <a:lvl3pPr marL="849017" algn="l" defTabSz="424508" rtl="0" eaLnBrk="1" latinLnBrk="0" hangingPunct="1">
+      <a:defRPr sz="1700" kern="1200">
         <a:solidFill>
           <a:schemeClr val="tx1"/>
         </a:solidFill>
@@ -46,8 +46,8 @@
         <a:cs typeface="+mn-cs"/>
       </a:defRPr>
     </a:lvl3pPr>
-    <a:lvl4pPr marL="1371600" algn="l" defTabSz="457200" rtl="0" eaLnBrk="1" latinLnBrk="0" hangingPunct="1">
-      <a:defRPr sz="1800" kern="1200">
+    <a:lvl4pPr marL="1273525" algn="l" defTabSz="424508" rtl="0" eaLnBrk="1" latinLnBrk="0" hangingPunct="1">
+      <a:defRPr sz="1700" kern="1200">
         <a:solidFill>
           <a:schemeClr val="tx1"/>
         </a:solidFill>
@@ -56,8 +56,8 @@
         <a:cs typeface="+mn-cs"/>
       </a:defRPr>
     </a:lvl4pPr>
-    <a:lvl5pPr marL="1828800" algn="l" defTabSz="457200" rtl="0" eaLnBrk="1" latinLnBrk="0" hangingPunct="1">
-      <a:defRPr sz="1800" kern="1200">
+    <a:lvl5pPr marL="1698033" algn="l" defTabSz="424508" rtl="0" eaLnBrk="1" latinLnBrk="0" hangingPunct="1">
+      <a:defRPr sz="1700" kern="1200">
         <a:solidFill>
           <a:schemeClr val="tx1"/>
         </a:solidFill>
@@ -66,8 +66,8 @@
         <a:cs typeface="+mn-cs"/>
       </a:defRPr>
     </a:lvl5pPr>
-    <a:lvl6pPr marL="2286000" algn="l" defTabSz="457200" rtl="0" eaLnBrk="1" latinLnBrk="0" hangingPunct="1">
-      <a:defRPr sz="1800" kern="1200">
+    <a:lvl6pPr marL="2122541" algn="l" defTabSz="424508" rtl="0" eaLnBrk="1" latinLnBrk="0" hangingPunct="1">
+      <a:defRPr sz="1700" kern="1200">
         <a:solidFill>
           <a:schemeClr val="tx1"/>
         </a:solidFill>
@@ -76,8 +76,8 @@
         <a:cs typeface="+mn-cs"/>
       </a:defRPr>
     </a:lvl6pPr>
-    <a:lvl7pPr marL="2743200" algn="l" defTabSz="457200" rtl="0" eaLnBrk="1" latinLnBrk="0" hangingPunct="1">
-      <a:defRPr sz="1800" kern="1200">
+    <a:lvl7pPr marL="2547049" algn="l" defTabSz="424508" rtl="0" eaLnBrk="1" latinLnBrk="0" hangingPunct="1">
+      <a:defRPr sz="1700" kern="1200">
         <a:solidFill>
           <a:schemeClr val="tx1"/>
         </a:solidFill>
@@ -86,8 +86,8 @@
         <a:cs typeface="+mn-cs"/>
       </a:defRPr>
     </a:lvl7pPr>
-    <a:lvl8pPr marL="3200400" algn="l" defTabSz="457200" rtl="0" eaLnBrk="1" latinLnBrk="0" hangingPunct="1">
-      <a:defRPr sz="1800" kern="1200">
+    <a:lvl8pPr marL="2971557" algn="l" defTabSz="424508" rtl="0" eaLnBrk="1" latinLnBrk="0" hangingPunct="1">
+      <a:defRPr sz="1700" kern="1200">
         <a:solidFill>
           <a:schemeClr val="tx1"/>
         </a:solidFill>
@@ -96,8 +96,8 @@
         <a:cs typeface="+mn-cs"/>
       </a:defRPr>
     </a:lvl8pPr>
-    <a:lvl9pPr marL="3657600" algn="l" defTabSz="457200" rtl="0" eaLnBrk="1" latinLnBrk="0" hangingPunct="1">
-      <a:defRPr sz="1800" kern="1200">
+    <a:lvl9pPr marL="3396065" algn="l" defTabSz="424508" rtl="0" eaLnBrk="1" latinLnBrk="0" hangingPunct="1">
+      <a:defRPr sz="1700" kern="1200">
         <a:solidFill>
           <a:schemeClr val="tx1"/>
         </a:solidFill>
@@ -110,7 +110,7 @@
   <p:extLst>
     <p:ext uri="{EFAFB233-063F-42B5-8137-9DF3F51BA10A}">
       <p15:sldGuideLst xmlns:p15="http://schemas.microsoft.com/office/powerpoint/2012/main">
-        <p15:guide id="1" orient="horz" pos="2160">
+        <p15:guide id="1" orient="horz" pos="1800">
           <p15:clr>
             <a:srgbClr val="A4A3A4"/>
           </p15:clr>
@@ -208,7 +208,7 @@
           <a:p>
             <a:fld id="{6DC0ABFD-927F-5E49-8195-2EED5AFEE728}" type="datetimeFigureOut">
               <a:rPr lang="en-US" smtClean="0"/>
-              <a:t>3/23/2014</a:t>
+              <a:t>3/24/2014</a:t>
             </a:fld>
             <a:endParaRPr lang="en-US" dirty="0"/>
           </a:p>
@@ -226,8 +226,8 @@
         </p:nvSpPr>
         <p:spPr>
           <a:xfrm>
-            <a:off x="1143000" y="685800"/>
-            <a:ext cx="4572000" cy="3429000"/>
+            <a:off x="685800" y="685800"/>
+            <a:ext cx="5486400" cy="3429000"/>
           </a:xfrm>
           <a:prstGeom prst="rect">
             <a:avLst/>
@@ -382,8 +382,8 @@
   </p:cSld>
   <p:clrMap bg1="lt1" tx1="dk1" bg2="lt2" tx2="dk2" accent1="accent1" accent2="accent2" accent3="accent3" accent4="accent4" accent5="accent5" accent6="accent6" hlink="hlink" folHlink="folHlink"/>
   <p:notesStyle>
-    <a:lvl1pPr marL="0" algn="l" defTabSz="457200" rtl="0" eaLnBrk="1" latinLnBrk="0" hangingPunct="1">
-      <a:defRPr sz="1200" kern="1200">
+    <a:lvl1pPr marL="0" algn="l" defTabSz="424508" rtl="0" eaLnBrk="1" latinLnBrk="0" hangingPunct="1">
+      <a:defRPr sz="1100" kern="1200">
         <a:solidFill>
           <a:schemeClr val="tx1"/>
         </a:solidFill>
@@ -392,8 +392,8 @@
         <a:cs typeface="+mn-cs"/>
       </a:defRPr>
     </a:lvl1pPr>
-    <a:lvl2pPr marL="457200" algn="l" defTabSz="457200" rtl="0" eaLnBrk="1" latinLnBrk="0" hangingPunct="1">
-      <a:defRPr sz="1200" kern="1200">
+    <a:lvl2pPr marL="424508" algn="l" defTabSz="424508" rtl="0" eaLnBrk="1" latinLnBrk="0" hangingPunct="1">
+      <a:defRPr sz="1100" kern="1200">
         <a:solidFill>
           <a:schemeClr val="tx1"/>
         </a:solidFill>
@@ -402,8 +402,8 @@
         <a:cs typeface="+mn-cs"/>
       </a:defRPr>
     </a:lvl2pPr>
-    <a:lvl3pPr marL="914400" algn="l" defTabSz="457200" rtl="0" eaLnBrk="1" latinLnBrk="0" hangingPunct="1">
-      <a:defRPr sz="1200" kern="1200">
+    <a:lvl3pPr marL="849017" algn="l" defTabSz="424508" rtl="0" eaLnBrk="1" latinLnBrk="0" hangingPunct="1">
+      <a:defRPr sz="1100" kern="1200">
         <a:solidFill>
           <a:schemeClr val="tx1"/>
         </a:solidFill>
@@ -412,8 +412,8 @@
         <a:cs typeface="+mn-cs"/>
       </a:defRPr>
     </a:lvl3pPr>
-    <a:lvl4pPr marL="1371600" algn="l" defTabSz="457200" rtl="0" eaLnBrk="1" latinLnBrk="0" hangingPunct="1">
-      <a:defRPr sz="1200" kern="1200">
+    <a:lvl4pPr marL="1273525" algn="l" defTabSz="424508" rtl="0" eaLnBrk="1" latinLnBrk="0" hangingPunct="1">
+      <a:defRPr sz="1100" kern="1200">
         <a:solidFill>
           <a:schemeClr val="tx1"/>
         </a:solidFill>
@@ -422,8 +422,8 @@
         <a:cs typeface="+mn-cs"/>
       </a:defRPr>
     </a:lvl4pPr>
-    <a:lvl5pPr marL="1828800" algn="l" defTabSz="457200" rtl="0" eaLnBrk="1" latinLnBrk="0" hangingPunct="1">
-      <a:defRPr sz="1200" kern="1200">
+    <a:lvl5pPr marL="1698033" algn="l" defTabSz="424508" rtl="0" eaLnBrk="1" latinLnBrk="0" hangingPunct="1">
+      <a:defRPr sz="1100" kern="1200">
         <a:solidFill>
           <a:schemeClr val="tx1"/>
         </a:solidFill>
@@ -432,8 +432,8 @@
         <a:cs typeface="+mn-cs"/>
       </a:defRPr>
     </a:lvl5pPr>
-    <a:lvl6pPr marL="2286000" algn="l" defTabSz="457200" rtl="0" eaLnBrk="1" latinLnBrk="0" hangingPunct="1">
-      <a:defRPr sz="1200" kern="1200">
+    <a:lvl6pPr marL="2122541" algn="l" defTabSz="424508" rtl="0" eaLnBrk="1" latinLnBrk="0" hangingPunct="1">
+      <a:defRPr sz="1100" kern="1200">
         <a:solidFill>
           <a:schemeClr val="tx1"/>
         </a:solidFill>
@@ -442,8 +442,8 @@
         <a:cs typeface="+mn-cs"/>
       </a:defRPr>
     </a:lvl6pPr>
-    <a:lvl7pPr marL="2743200" algn="l" defTabSz="457200" rtl="0" eaLnBrk="1" latinLnBrk="0" hangingPunct="1">
-      <a:defRPr sz="1200" kern="1200">
+    <a:lvl7pPr marL="2547049" algn="l" defTabSz="424508" rtl="0" eaLnBrk="1" latinLnBrk="0" hangingPunct="1">
+      <a:defRPr sz="1100" kern="1200">
         <a:solidFill>
           <a:schemeClr val="tx1"/>
         </a:solidFill>
@@ -452,8 +452,8 @@
         <a:cs typeface="+mn-cs"/>
       </a:defRPr>
     </a:lvl7pPr>
-    <a:lvl8pPr marL="3200400" algn="l" defTabSz="457200" rtl="0" eaLnBrk="1" latinLnBrk="0" hangingPunct="1">
-      <a:defRPr sz="1200" kern="1200">
+    <a:lvl8pPr marL="2971557" algn="l" defTabSz="424508" rtl="0" eaLnBrk="1" latinLnBrk="0" hangingPunct="1">
+      <a:defRPr sz="1100" kern="1200">
         <a:solidFill>
           <a:schemeClr val="tx1"/>
         </a:solidFill>
@@ -462,8 +462,8 @@
         <a:cs typeface="+mn-cs"/>
       </a:defRPr>
     </a:lvl8pPr>
-    <a:lvl9pPr marL="3657600" algn="l" defTabSz="457200" rtl="0" eaLnBrk="1" latinLnBrk="0" hangingPunct="1">
-      <a:defRPr sz="1200" kern="1200">
+    <a:lvl9pPr marL="3396065" algn="l" defTabSz="424508" rtl="0" eaLnBrk="1" latinLnBrk="0" hangingPunct="1">
+      <a:defRPr sz="1100" kern="1200">
         <a:solidFill>
           <a:schemeClr val="tx1"/>
         </a:solidFill>
@@ -505,8 +505,8 @@
         </p:nvSpPr>
         <p:spPr>
           <a:xfrm>
-            <a:off x="685800" y="2130425"/>
-            <a:ext cx="7772400" cy="1470025"/>
+            <a:off x="685800" y="1775355"/>
+            <a:ext cx="7772400" cy="1225021"/>
           </a:xfrm>
         </p:spPr>
         <p:txBody>
@@ -533,8 +533,8 @@
         </p:nvSpPr>
         <p:spPr>
           <a:xfrm>
-            <a:off x="1371600" y="3886200"/>
-            <a:ext cx="6400800" cy="1752600"/>
+            <a:off x="1371600" y="3238500"/>
+            <a:ext cx="6400800" cy="1460500"/>
           </a:xfrm>
         </p:spPr>
         <p:txBody>
@@ -550,7 +550,7 @@
                 </a:solidFill>
               </a:defRPr>
             </a:lvl1pPr>
-            <a:lvl2pPr marL="457200" indent="0" algn="ctr">
+            <a:lvl2pPr marL="424508" indent="0" algn="ctr">
               <a:buNone/>
               <a:defRPr>
                 <a:solidFill>
@@ -560,7 +560,7 @@
                 </a:solidFill>
               </a:defRPr>
             </a:lvl2pPr>
-            <a:lvl3pPr marL="914400" indent="0" algn="ctr">
+            <a:lvl3pPr marL="849017" indent="0" algn="ctr">
               <a:buNone/>
               <a:defRPr>
                 <a:solidFill>
@@ -570,7 +570,7 @@
                 </a:solidFill>
               </a:defRPr>
             </a:lvl3pPr>
-            <a:lvl4pPr marL="1371600" indent="0" algn="ctr">
+            <a:lvl4pPr marL="1273525" indent="0" algn="ctr">
               <a:buNone/>
               <a:defRPr>
                 <a:solidFill>
@@ -580,7 +580,7 @@
                 </a:solidFill>
               </a:defRPr>
             </a:lvl4pPr>
-            <a:lvl5pPr marL="1828800" indent="0" algn="ctr">
+            <a:lvl5pPr marL="1698033" indent="0" algn="ctr">
               <a:buNone/>
               <a:defRPr>
                 <a:solidFill>
@@ -590,7 +590,7 @@
                 </a:solidFill>
               </a:defRPr>
             </a:lvl5pPr>
-            <a:lvl6pPr marL="2286000" indent="0" algn="ctr">
+            <a:lvl6pPr marL="2122541" indent="0" algn="ctr">
               <a:buNone/>
               <a:defRPr>
                 <a:solidFill>
@@ -600,7 +600,7 @@
                 </a:solidFill>
               </a:defRPr>
             </a:lvl6pPr>
-            <a:lvl7pPr marL="2743200" indent="0" algn="ctr">
+            <a:lvl7pPr marL="2547049" indent="0" algn="ctr">
               <a:buNone/>
               <a:defRPr>
                 <a:solidFill>
@@ -610,7 +610,7 @@
                 </a:solidFill>
               </a:defRPr>
             </a:lvl7pPr>
-            <a:lvl8pPr marL="3200400" indent="0" algn="ctr">
+            <a:lvl8pPr marL="2971557" indent="0" algn="ctr">
               <a:buNone/>
               <a:defRPr>
                 <a:solidFill>
@@ -620,7 +620,7 @@
                 </a:solidFill>
               </a:defRPr>
             </a:lvl8pPr>
-            <a:lvl9pPr marL="3657600" indent="0" algn="ctr">
+            <a:lvl9pPr marL="3396065" indent="0" algn="ctr">
               <a:buNone/>
               <a:defRPr>
                 <a:solidFill>
@@ -657,7 +657,7 @@
           <a:p>
             <a:fld id="{E1D2620B-6619-314E-A368-62BBC874E253}" type="datetimeFigureOut">
               <a:rPr lang="en-US" smtClean="0"/>
-              <a:t>3/23/2014</a:t>
+              <a:t>3/24/2014</a:t>
             </a:fld>
             <a:endParaRPr lang="en-US" dirty="0"/>
           </a:p>
@@ -827,7 +827,7 @@
           <a:p>
             <a:fld id="{E1D2620B-6619-314E-A368-62BBC874E253}" type="datetimeFigureOut">
               <a:rPr lang="en-US" smtClean="0"/>
-              <a:t>3/23/2014</a:t>
+              <a:t>3/24/2014</a:t>
             </a:fld>
             <a:endParaRPr lang="en-US" dirty="0"/>
           </a:p>
@@ -917,8 +917,8 @@
         </p:nvSpPr>
         <p:spPr>
           <a:xfrm>
-            <a:off x="6629400" y="274638"/>
-            <a:ext cx="2057400" cy="5851525"/>
+            <a:off x="6629400" y="228866"/>
+            <a:ext cx="2057400" cy="4876271"/>
           </a:xfrm>
         </p:spPr>
         <p:txBody>
@@ -945,8 +945,8 @@
         </p:nvSpPr>
         <p:spPr>
           <a:xfrm>
-            <a:off x="457200" y="274638"/>
-            <a:ext cx="6019800" cy="5851525"/>
+            <a:off x="457200" y="228866"/>
+            <a:ext cx="6019800" cy="4876271"/>
           </a:xfrm>
         </p:spPr>
         <p:txBody>
@@ -1007,7 +1007,7 @@
           <a:p>
             <a:fld id="{E1D2620B-6619-314E-A368-62BBC874E253}" type="datetimeFigureOut">
               <a:rPr lang="en-US" smtClean="0"/>
-              <a:t>3/23/2014</a:t>
+              <a:t>3/24/2014</a:t>
             </a:fld>
             <a:endParaRPr lang="en-US" dirty="0"/>
           </a:p>
@@ -1177,7 +1177,7 @@
           <a:p>
             <a:fld id="{E1D2620B-6619-314E-A368-62BBC874E253}" type="datetimeFigureOut">
               <a:rPr lang="en-US" smtClean="0"/>
-              <a:t>3/23/2014</a:t>
+              <a:t>3/24/2014</a:t>
             </a:fld>
             <a:endParaRPr lang="en-US" dirty="0"/>
           </a:p>
@@ -1267,15 +1267,15 @@
         </p:nvSpPr>
         <p:spPr>
           <a:xfrm>
-            <a:off x="722313" y="4406900"/>
-            <a:ext cx="7772400" cy="1362075"/>
+            <a:off x="722313" y="3672418"/>
+            <a:ext cx="7772400" cy="1135062"/>
           </a:xfrm>
         </p:spPr>
         <p:txBody>
           <a:bodyPr anchor="t"/>
           <a:lstStyle>
             <a:lvl1pPr algn="l">
-              <a:defRPr sz="4000" b="1" cap="all"/>
+              <a:defRPr sz="3700" b="1" cap="all"/>
             </a:lvl1pPr>
           </a:lstStyle>
           <a:p>
@@ -1299,8 +1299,8 @@
         </p:nvSpPr>
         <p:spPr>
           <a:xfrm>
-            <a:off x="722313" y="2906713"/>
-            <a:ext cx="7772400" cy="1500187"/>
+            <a:off x="722313" y="2422261"/>
+            <a:ext cx="7772400" cy="1250156"/>
           </a:xfrm>
         </p:spPr>
         <p:txBody>
@@ -1308,7 +1308,7 @@
           <a:lstStyle>
             <a:lvl1pPr marL="0" indent="0">
               <a:buNone/>
-              <a:defRPr sz="2000">
+              <a:defRPr sz="1900">
                 <a:solidFill>
                   <a:schemeClr val="tx1">
                     <a:tint val="75000"/>
@@ -1316,9 +1316,9 @@
                 </a:solidFill>
               </a:defRPr>
             </a:lvl1pPr>
-            <a:lvl2pPr marL="457200" indent="0">
-              <a:buNone/>
-              <a:defRPr sz="1800">
+            <a:lvl2pPr marL="424508" indent="0">
+              <a:buNone/>
+              <a:defRPr sz="1700">
                 <a:solidFill>
                   <a:schemeClr val="tx1">
                     <a:tint val="75000"/>
@@ -1326,9 +1326,9 @@
                 </a:solidFill>
               </a:defRPr>
             </a:lvl2pPr>
-            <a:lvl3pPr marL="914400" indent="0">
-              <a:buNone/>
-              <a:defRPr sz="1600">
+            <a:lvl3pPr marL="849017" indent="0">
+              <a:buNone/>
+              <a:defRPr sz="1400">
                 <a:solidFill>
                   <a:schemeClr val="tx1">
                     <a:tint val="75000"/>
@@ -1336,9 +1336,9 @@
                 </a:solidFill>
               </a:defRPr>
             </a:lvl3pPr>
-            <a:lvl4pPr marL="1371600" indent="0">
-              <a:buNone/>
-              <a:defRPr sz="1400">
+            <a:lvl4pPr marL="1273525" indent="0">
+              <a:buNone/>
+              <a:defRPr sz="1300">
                 <a:solidFill>
                   <a:schemeClr val="tx1">
                     <a:tint val="75000"/>
@@ -1346,9 +1346,9 @@
                 </a:solidFill>
               </a:defRPr>
             </a:lvl4pPr>
-            <a:lvl5pPr marL="1828800" indent="0">
-              <a:buNone/>
-              <a:defRPr sz="1400">
+            <a:lvl5pPr marL="1698033" indent="0">
+              <a:buNone/>
+              <a:defRPr sz="1300">
                 <a:solidFill>
                   <a:schemeClr val="tx1">
                     <a:tint val="75000"/>
@@ -1356,9 +1356,9 @@
                 </a:solidFill>
               </a:defRPr>
             </a:lvl5pPr>
-            <a:lvl6pPr marL="2286000" indent="0">
-              <a:buNone/>
-              <a:defRPr sz="1400">
+            <a:lvl6pPr marL="2122541" indent="0">
+              <a:buNone/>
+              <a:defRPr sz="1300">
                 <a:solidFill>
                   <a:schemeClr val="tx1">
                     <a:tint val="75000"/>
@@ -1366,9 +1366,9 @@
                 </a:solidFill>
               </a:defRPr>
             </a:lvl6pPr>
-            <a:lvl7pPr marL="2743200" indent="0">
-              <a:buNone/>
-              <a:defRPr sz="1400">
+            <a:lvl7pPr marL="2547049" indent="0">
+              <a:buNone/>
+              <a:defRPr sz="1300">
                 <a:solidFill>
                   <a:schemeClr val="tx1">
                     <a:tint val="75000"/>
@@ -1376,9 +1376,9 @@
                 </a:solidFill>
               </a:defRPr>
             </a:lvl7pPr>
-            <a:lvl8pPr marL="3200400" indent="0">
-              <a:buNone/>
-              <a:defRPr sz="1400">
+            <a:lvl8pPr marL="2971557" indent="0">
+              <a:buNone/>
+              <a:defRPr sz="1300">
                 <a:solidFill>
                   <a:schemeClr val="tx1">
                     <a:tint val="75000"/>
@@ -1386,9 +1386,9 @@
                 </a:solidFill>
               </a:defRPr>
             </a:lvl8pPr>
-            <a:lvl9pPr marL="3657600" indent="0">
-              <a:buNone/>
-              <a:defRPr sz="1400">
+            <a:lvl9pPr marL="3396065" indent="0">
+              <a:buNone/>
+              <a:defRPr sz="1300">
                 <a:solidFill>
                   <a:schemeClr val="tx1">
                     <a:tint val="75000"/>
@@ -1423,7 +1423,7 @@
           <a:p>
             <a:fld id="{E1D2620B-6619-314E-A368-62BBC874E253}" type="datetimeFigureOut">
               <a:rPr lang="en-US" smtClean="0"/>
-              <a:t>3/23/2014</a:t>
+              <a:t>3/24/2014</a:t>
             </a:fld>
             <a:endParaRPr lang="en-US" dirty="0"/>
           </a:p>
@@ -1536,39 +1536,39 @@
         </p:nvSpPr>
         <p:spPr>
           <a:xfrm>
-            <a:off x="457200" y="1600200"/>
-            <a:ext cx="4038600" cy="4525963"/>
+            <a:off x="457200" y="1333501"/>
+            <a:ext cx="4038600" cy="3771636"/>
           </a:xfrm>
         </p:spPr>
         <p:txBody>
           <a:bodyPr/>
           <a:lstStyle>
             <a:lvl1pPr>
-              <a:defRPr sz="2800"/>
+              <a:defRPr sz="2600"/>
             </a:lvl1pPr>
             <a:lvl2pPr>
-              <a:defRPr sz="2400"/>
+              <a:defRPr sz="2300"/>
             </a:lvl2pPr>
             <a:lvl3pPr>
-              <a:defRPr sz="2000"/>
+              <a:defRPr sz="1900"/>
             </a:lvl3pPr>
             <a:lvl4pPr>
-              <a:defRPr sz="1800"/>
+              <a:defRPr sz="1700"/>
             </a:lvl4pPr>
             <a:lvl5pPr>
-              <a:defRPr sz="1800"/>
+              <a:defRPr sz="1700"/>
             </a:lvl5pPr>
             <a:lvl6pPr>
-              <a:defRPr sz="1800"/>
+              <a:defRPr sz="1700"/>
             </a:lvl6pPr>
             <a:lvl7pPr>
-              <a:defRPr sz="1800"/>
+              <a:defRPr sz="1700"/>
             </a:lvl7pPr>
             <a:lvl8pPr>
-              <a:defRPr sz="1800"/>
+              <a:defRPr sz="1700"/>
             </a:lvl8pPr>
             <a:lvl9pPr>
-              <a:defRPr sz="1800"/>
+              <a:defRPr sz="1700"/>
             </a:lvl9pPr>
           </a:lstStyle>
           <a:p>
@@ -1621,39 +1621,39 @@
         </p:nvSpPr>
         <p:spPr>
           <a:xfrm>
-            <a:off x="4648200" y="1600200"/>
-            <a:ext cx="4038600" cy="4525963"/>
+            <a:off x="4648200" y="1333501"/>
+            <a:ext cx="4038600" cy="3771636"/>
           </a:xfrm>
         </p:spPr>
         <p:txBody>
           <a:bodyPr/>
           <a:lstStyle>
             <a:lvl1pPr>
-              <a:defRPr sz="2800"/>
+              <a:defRPr sz="2600"/>
             </a:lvl1pPr>
             <a:lvl2pPr>
-              <a:defRPr sz="2400"/>
+              <a:defRPr sz="2300"/>
             </a:lvl2pPr>
             <a:lvl3pPr>
-              <a:defRPr sz="2000"/>
+              <a:defRPr sz="1900"/>
             </a:lvl3pPr>
             <a:lvl4pPr>
-              <a:defRPr sz="1800"/>
+              <a:defRPr sz="1700"/>
             </a:lvl4pPr>
             <a:lvl5pPr>
-              <a:defRPr sz="1800"/>
+              <a:defRPr sz="1700"/>
             </a:lvl5pPr>
             <a:lvl6pPr>
-              <a:defRPr sz="1800"/>
+              <a:defRPr sz="1700"/>
             </a:lvl6pPr>
             <a:lvl7pPr>
-              <a:defRPr sz="1800"/>
+              <a:defRPr sz="1700"/>
             </a:lvl7pPr>
             <a:lvl8pPr>
-              <a:defRPr sz="1800"/>
+              <a:defRPr sz="1700"/>
             </a:lvl8pPr>
             <a:lvl9pPr>
-              <a:defRPr sz="1800"/>
+              <a:defRPr sz="1700"/>
             </a:lvl9pPr>
           </a:lstStyle>
           <a:p>
@@ -1711,7 +1711,7 @@
           <a:p>
             <a:fld id="{E1D2620B-6619-314E-A368-62BBC874E253}" type="datetimeFigureOut">
               <a:rPr lang="en-US" smtClean="0"/>
-              <a:t>3/23/2014</a:t>
+              <a:t>3/24/2014</a:t>
             </a:fld>
             <a:endParaRPr lang="en-US" dirty="0"/>
           </a:p>
@@ -1828,8 +1828,8 @@
         </p:nvSpPr>
         <p:spPr>
           <a:xfrm>
-            <a:off x="457200" y="1535113"/>
-            <a:ext cx="4040188" cy="639762"/>
+            <a:off x="457200" y="1279261"/>
+            <a:ext cx="4040188" cy="533135"/>
           </a:xfrm>
         </p:spPr>
         <p:txBody>
@@ -1837,39 +1837,39 @@
           <a:lstStyle>
             <a:lvl1pPr marL="0" indent="0">
               <a:buNone/>
-              <a:defRPr sz="2400" b="1"/>
+              <a:defRPr sz="2300" b="1"/>
             </a:lvl1pPr>
-            <a:lvl2pPr marL="457200" indent="0">
-              <a:buNone/>
-              <a:defRPr sz="2000" b="1"/>
+            <a:lvl2pPr marL="424508" indent="0">
+              <a:buNone/>
+              <a:defRPr sz="1900" b="1"/>
             </a:lvl2pPr>
-            <a:lvl3pPr marL="914400" indent="0">
-              <a:buNone/>
-              <a:defRPr sz="1800" b="1"/>
+            <a:lvl3pPr marL="849017" indent="0">
+              <a:buNone/>
+              <a:defRPr sz="1700" b="1"/>
             </a:lvl3pPr>
-            <a:lvl4pPr marL="1371600" indent="0">
-              <a:buNone/>
-              <a:defRPr sz="1600" b="1"/>
+            <a:lvl4pPr marL="1273525" indent="0">
+              <a:buNone/>
+              <a:defRPr sz="1400" b="1"/>
             </a:lvl4pPr>
-            <a:lvl5pPr marL="1828800" indent="0">
-              <a:buNone/>
-              <a:defRPr sz="1600" b="1"/>
+            <a:lvl5pPr marL="1698033" indent="0">
+              <a:buNone/>
+              <a:defRPr sz="1400" b="1"/>
             </a:lvl5pPr>
-            <a:lvl6pPr marL="2286000" indent="0">
-              <a:buNone/>
-              <a:defRPr sz="1600" b="1"/>
+            <a:lvl6pPr marL="2122541" indent="0">
+              <a:buNone/>
+              <a:defRPr sz="1400" b="1"/>
             </a:lvl6pPr>
-            <a:lvl7pPr marL="2743200" indent="0">
-              <a:buNone/>
-              <a:defRPr sz="1600" b="1"/>
+            <a:lvl7pPr marL="2547049" indent="0">
+              <a:buNone/>
+              <a:defRPr sz="1400" b="1"/>
             </a:lvl7pPr>
-            <a:lvl8pPr marL="3200400" indent="0">
-              <a:buNone/>
-              <a:defRPr sz="1600" b="1"/>
+            <a:lvl8pPr marL="2971557" indent="0">
+              <a:buNone/>
+              <a:defRPr sz="1400" b="1"/>
             </a:lvl8pPr>
-            <a:lvl9pPr marL="3657600" indent="0">
-              <a:buNone/>
-              <a:defRPr sz="1600" b="1"/>
+            <a:lvl9pPr marL="3396065" indent="0">
+              <a:buNone/>
+              <a:defRPr sz="1400" b="1"/>
             </a:lvl9pPr>
           </a:lstStyle>
           <a:p>
@@ -1893,39 +1893,39 @@
         </p:nvSpPr>
         <p:spPr>
           <a:xfrm>
-            <a:off x="457200" y="2174875"/>
-            <a:ext cx="4040188" cy="3951288"/>
+            <a:off x="457200" y="1812396"/>
+            <a:ext cx="4040188" cy="3292740"/>
           </a:xfrm>
         </p:spPr>
         <p:txBody>
           <a:bodyPr/>
           <a:lstStyle>
             <a:lvl1pPr>
-              <a:defRPr sz="2400"/>
+              <a:defRPr sz="2300"/>
             </a:lvl1pPr>
             <a:lvl2pPr>
-              <a:defRPr sz="2000"/>
+              <a:defRPr sz="1900"/>
             </a:lvl2pPr>
             <a:lvl3pPr>
-              <a:defRPr sz="1800"/>
+              <a:defRPr sz="1700"/>
             </a:lvl3pPr>
             <a:lvl4pPr>
-              <a:defRPr sz="1600"/>
+              <a:defRPr sz="1400"/>
             </a:lvl4pPr>
             <a:lvl5pPr>
-              <a:defRPr sz="1600"/>
+              <a:defRPr sz="1400"/>
             </a:lvl5pPr>
             <a:lvl6pPr>
-              <a:defRPr sz="1600"/>
+              <a:defRPr sz="1400"/>
             </a:lvl6pPr>
             <a:lvl7pPr>
-              <a:defRPr sz="1600"/>
+              <a:defRPr sz="1400"/>
             </a:lvl7pPr>
             <a:lvl8pPr>
-              <a:defRPr sz="1600"/>
+              <a:defRPr sz="1400"/>
             </a:lvl8pPr>
             <a:lvl9pPr>
-              <a:defRPr sz="1600"/>
+              <a:defRPr sz="1400"/>
             </a:lvl9pPr>
           </a:lstStyle>
           <a:p>
@@ -1978,8 +1978,8 @@
         </p:nvSpPr>
         <p:spPr>
           <a:xfrm>
-            <a:off x="4645025" y="1535113"/>
-            <a:ext cx="4041775" cy="639762"/>
+            <a:off x="4645026" y="1279261"/>
+            <a:ext cx="4041775" cy="533135"/>
           </a:xfrm>
         </p:spPr>
         <p:txBody>
@@ -1987,39 +1987,39 @@
           <a:lstStyle>
             <a:lvl1pPr marL="0" indent="0">
               <a:buNone/>
-              <a:defRPr sz="2400" b="1"/>
+              <a:defRPr sz="2300" b="1"/>
             </a:lvl1pPr>
-            <a:lvl2pPr marL="457200" indent="0">
-              <a:buNone/>
-              <a:defRPr sz="2000" b="1"/>
+            <a:lvl2pPr marL="424508" indent="0">
+              <a:buNone/>
+              <a:defRPr sz="1900" b="1"/>
             </a:lvl2pPr>
-            <a:lvl3pPr marL="914400" indent="0">
-              <a:buNone/>
-              <a:defRPr sz="1800" b="1"/>
+            <a:lvl3pPr marL="849017" indent="0">
+              <a:buNone/>
+              <a:defRPr sz="1700" b="1"/>
             </a:lvl3pPr>
-            <a:lvl4pPr marL="1371600" indent="0">
-              <a:buNone/>
-              <a:defRPr sz="1600" b="1"/>
+            <a:lvl4pPr marL="1273525" indent="0">
+              <a:buNone/>
+              <a:defRPr sz="1400" b="1"/>
             </a:lvl4pPr>
-            <a:lvl5pPr marL="1828800" indent="0">
-              <a:buNone/>
-              <a:defRPr sz="1600" b="1"/>
+            <a:lvl5pPr marL="1698033" indent="0">
+              <a:buNone/>
+              <a:defRPr sz="1400" b="1"/>
             </a:lvl5pPr>
-            <a:lvl6pPr marL="2286000" indent="0">
-              <a:buNone/>
-              <a:defRPr sz="1600" b="1"/>
+            <a:lvl6pPr marL="2122541" indent="0">
+              <a:buNone/>
+              <a:defRPr sz="1400" b="1"/>
             </a:lvl6pPr>
-            <a:lvl7pPr marL="2743200" indent="0">
-              <a:buNone/>
-              <a:defRPr sz="1600" b="1"/>
+            <a:lvl7pPr marL="2547049" indent="0">
+              <a:buNone/>
+              <a:defRPr sz="1400" b="1"/>
             </a:lvl7pPr>
-            <a:lvl8pPr marL="3200400" indent="0">
-              <a:buNone/>
-              <a:defRPr sz="1600" b="1"/>
+            <a:lvl8pPr marL="2971557" indent="0">
+              <a:buNone/>
+              <a:defRPr sz="1400" b="1"/>
             </a:lvl8pPr>
-            <a:lvl9pPr marL="3657600" indent="0">
-              <a:buNone/>
-              <a:defRPr sz="1600" b="1"/>
+            <a:lvl9pPr marL="3396065" indent="0">
+              <a:buNone/>
+              <a:defRPr sz="1400" b="1"/>
             </a:lvl9pPr>
           </a:lstStyle>
           <a:p>
@@ -2043,39 +2043,39 @@
         </p:nvSpPr>
         <p:spPr>
           <a:xfrm>
-            <a:off x="4645025" y="2174875"/>
-            <a:ext cx="4041775" cy="3951288"/>
+            <a:off x="4645026" y="1812396"/>
+            <a:ext cx="4041775" cy="3292740"/>
           </a:xfrm>
         </p:spPr>
         <p:txBody>
           <a:bodyPr/>
           <a:lstStyle>
             <a:lvl1pPr>
-              <a:defRPr sz="2400"/>
+              <a:defRPr sz="2300"/>
             </a:lvl1pPr>
             <a:lvl2pPr>
-              <a:defRPr sz="2000"/>
+              <a:defRPr sz="1900"/>
             </a:lvl2pPr>
             <a:lvl3pPr>
-              <a:defRPr sz="1800"/>
+              <a:defRPr sz="1700"/>
             </a:lvl3pPr>
             <a:lvl4pPr>
-              <a:defRPr sz="1600"/>
+              <a:defRPr sz="1400"/>
             </a:lvl4pPr>
             <a:lvl5pPr>
-              <a:defRPr sz="1600"/>
+              <a:defRPr sz="1400"/>
             </a:lvl5pPr>
             <a:lvl6pPr>
-              <a:defRPr sz="1600"/>
+              <a:defRPr sz="1400"/>
             </a:lvl6pPr>
             <a:lvl7pPr>
-              <a:defRPr sz="1600"/>
+              <a:defRPr sz="1400"/>
             </a:lvl7pPr>
             <a:lvl8pPr>
-              <a:defRPr sz="1600"/>
+              <a:defRPr sz="1400"/>
             </a:lvl8pPr>
             <a:lvl9pPr>
-              <a:defRPr sz="1600"/>
+              <a:defRPr sz="1400"/>
             </a:lvl9pPr>
           </a:lstStyle>
           <a:p>
@@ -2133,7 +2133,7 @@
           <a:p>
             <a:fld id="{E1D2620B-6619-314E-A368-62BBC874E253}" type="datetimeFigureOut">
               <a:rPr lang="en-US" smtClean="0"/>
-              <a:t>3/23/2014</a:t>
+              <a:t>3/24/2014</a:t>
             </a:fld>
             <a:endParaRPr lang="en-US" dirty="0"/>
           </a:p>
@@ -2251,7 +2251,7 @@
           <a:p>
             <a:fld id="{E1D2620B-6619-314E-A368-62BBC874E253}" type="datetimeFigureOut">
               <a:rPr lang="en-US" smtClean="0"/>
-              <a:t>3/23/2014</a:t>
+              <a:t>3/24/2014</a:t>
             </a:fld>
             <a:endParaRPr lang="en-US" dirty="0"/>
           </a:p>
@@ -2346,7 +2346,7 @@
           <a:p>
             <a:fld id="{E1D2620B-6619-314E-A368-62BBC874E253}" type="datetimeFigureOut">
               <a:rPr lang="en-US" smtClean="0"/>
-              <a:t>3/23/2014</a:t>
+              <a:t>3/24/2014</a:t>
             </a:fld>
             <a:endParaRPr lang="en-US" dirty="0"/>
           </a:p>
@@ -2436,15 +2436,15 @@
         </p:nvSpPr>
         <p:spPr>
           <a:xfrm>
-            <a:off x="457200" y="273050"/>
-            <a:ext cx="3008313" cy="1162050"/>
+            <a:off x="457201" y="227542"/>
+            <a:ext cx="3008313" cy="968375"/>
           </a:xfrm>
         </p:spPr>
         <p:txBody>
           <a:bodyPr anchor="b"/>
           <a:lstStyle>
             <a:lvl1pPr algn="l">
-              <a:defRPr sz="2000" b="1"/>
+              <a:defRPr sz="1900" b="1"/>
             </a:lvl1pPr>
           </a:lstStyle>
           <a:p>
@@ -2468,39 +2468,39 @@
         </p:nvSpPr>
         <p:spPr>
           <a:xfrm>
-            <a:off x="3575050" y="273050"/>
-            <a:ext cx="5111750" cy="5853113"/>
+            <a:off x="3575050" y="227542"/>
+            <a:ext cx="5111750" cy="4877594"/>
           </a:xfrm>
         </p:spPr>
         <p:txBody>
           <a:bodyPr/>
           <a:lstStyle>
             <a:lvl1pPr>
-              <a:defRPr sz="3200"/>
+              <a:defRPr sz="3000"/>
             </a:lvl1pPr>
             <a:lvl2pPr>
-              <a:defRPr sz="2800"/>
+              <a:defRPr sz="2600"/>
             </a:lvl2pPr>
             <a:lvl3pPr>
-              <a:defRPr sz="2400"/>
+              <a:defRPr sz="2300"/>
             </a:lvl3pPr>
             <a:lvl4pPr>
-              <a:defRPr sz="2000"/>
+              <a:defRPr sz="1900"/>
             </a:lvl4pPr>
             <a:lvl5pPr>
-              <a:defRPr sz="2000"/>
+              <a:defRPr sz="1900"/>
             </a:lvl5pPr>
             <a:lvl6pPr>
-              <a:defRPr sz="2000"/>
+              <a:defRPr sz="1900"/>
             </a:lvl6pPr>
             <a:lvl7pPr>
-              <a:defRPr sz="2000"/>
+              <a:defRPr sz="1900"/>
             </a:lvl7pPr>
             <a:lvl8pPr>
-              <a:defRPr sz="2000"/>
+              <a:defRPr sz="1900"/>
             </a:lvl8pPr>
             <a:lvl9pPr>
-              <a:defRPr sz="2000"/>
+              <a:defRPr sz="1900"/>
             </a:lvl9pPr>
           </a:lstStyle>
           <a:p>
@@ -2553,8 +2553,8 @@
         </p:nvSpPr>
         <p:spPr>
           <a:xfrm>
-            <a:off x="457200" y="1435100"/>
-            <a:ext cx="3008313" cy="4691063"/>
+            <a:off x="457201" y="1195917"/>
+            <a:ext cx="3008313" cy="3909219"/>
           </a:xfrm>
         </p:spPr>
         <p:txBody>
@@ -2562,37 +2562,37 @@
           <a:lstStyle>
             <a:lvl1pPr marL="0" indent="0">
               <a:buNone/>
-              <a:defRPr sz="1400"/>
+              <a:defRPr sz="1300"/>
             </a:lvl1pPr>
-            <a:lvl2pPr marL="457200" indent="0">
-              <a:buNone/>
-              <a:defRPr sz="1200"/>
+            <a:lvl2pPr marL="424508" indent="0">
+              <a:buNone/>
+              <a:defRPr sz="1100"/>
             </a:lvl2pPr>
-            <a:lvl3pPr marL="914400" indent="0">
-              <a:buNone/>
-              <a:defRPr sz="1000"/>
+            <a:lvl3pPr marL="849017" indent="0">
+              <a:buNone/>
+              <a:defRPr sz="900"/>
             </a:lvl3pPr>
-            <a:lvl4pPr marL="1371600" indent="0">
+            <a:lvl4pPr marL="1273525" indent="0">
               <a:buNone/>
               <a:defRPr sz="900"/>
             </a:lvl4pPr>
-            <a:lvl5pPr marL="1828800" indent="0">
+            <a:lvl5pPr marL="1698033" indent="0">
               <a:buNone/>
               <a:defRPr sz="900"/>
             </a:lvl5pPr>
-            <a:lvl6pPr marL="2286000" indent="0">
+            <a:lvl6pPr marL="2122541" indent="0">
               <a:buNone/>
               <a:defRPr sz="900"/>
             </a:lvl6pPr>
-            <a:lvl7pPr marL="2743200" indent="0">
+            <a:lvl7pPr marL="2547049" indent="0">
               <a:buNone/>
               <a:defRPr sz="900"/>
             </a:lvl7pPr>
-            <a:lvl8pPr marL="3200400" indent="0">
+            <a:lvl8pPr marL="2971557" indent="0">
               <a:buNone/>
               <a:defRPr sz="900"/>
             </a:lvl8pPr>
-            <a:lvl9pPr marL="3657600" indent="0">
+            <a:lvl9pPr marL="3396065" indent="0">
               <a:buNone/>
               <a:defRPr sz="900"/>
             </a:lvl9pPr>
@@ -2623,7 +2623,7 @@
           <a:p>
             <a:fld id="{E1D2620B-6619-314E-A368-62BBC874E253}" type="datetimeFigureOut">
               <a:rPr lang="en-US" smtClean="0"/>
-              <a:t>3/23/2014</a:t>
+              <a:t>3/24/2014</a:t>
             </a:fld>
             <a:endParaRPr lang="en-US" dirty="0"/>
           </a:p>
@@ -2713,15 +2713,15 @@
         </p:nvSpPr>
         <p:spPr>
           <a:xfrm>
-            <a:off x="1792288" y="4800600"/>
-            <a:ext cx="5486400" cy="566738"/>
+            <a:off x="1792288" y="4000500"/>
+            <a:ext cx="5486400" cy="472282"/>
           </a:xfrm>
         </p:spPr>
         <p:txBody>
           <a:bodyPr anchor="b"/>
           <a:lstStyle>
             <a:lvl1pPr algn="l">
-              <a:defRPr sz="2000" b="1"/>
+              <a:defRPr sz="1900" b="1"/>
             </a:lvl1pPr>
           </a:lstStyle>
           <a:p>
@@ -2745,8 +2745,8 @@
         </p:nvSpPr>
         <p:spPr>
           <a:xfrm>
-            <a:off x="1792288" y="612775"/>
-            <a:ext cx="5486400" cy="4114800"/>
+            <a:off x="1792288" y="510646"/>
+            <a:ext cx="5486400" cy="3429000"/>
           </a:xfrm>
         </p:spPr>
         <p:txBody>
@@ -2754,39 +2754,39 @@
           <a:lstStyle>
             <a:lvl1pPr marL="0" indent="0">
               <a:buNone/>
-              <a:defRPr sz="3200"/>
+              <a:defRPr sz="3000"/>
             </a:lvl1pPr>
-            <a:lvl2pPr marL="457200" indent="0">
-              <a:buNone/>
-              <a:defRPr sz="2800"/>
+            <a:lvl2pPr marL="424508" indent="0">
+              <a:buNone/>
+              <a:defRPr sz="2600"/>
             </a:lvl2pPr>
-            <a:lvl3pPr marL="914400" indent="0">
-              <a:buNone/>
-              <a:defRPr sz="2400"/>
+            <a:lvl3pPr marL="849017" indent="0">
+              <a:buNone/>
+              <a:defRPr sz="2300"/>
             </a:lvl3pPr>
-            <a:lvl4pPr marL="1371600" indent="0">
-              <a:buNone/>
-              <a:defRPr sz="2000"/>
+            <a:lvl4pPr marL="1273525" indent="0">
+              <a:buNone/>
+              <a:defRPr sz="1900"/>
             </a:lvl4pPr>
-            <a:lvl5pPr marL="1828800" indent="0">
-              <a:buNone/>
-              <a:defRPr sz="2000"/>
+            <a:lvl5pPr marL="1698033" indent="0">
+              <a:buNone/>
+              <a:defRPr sz="1900"/>
             </a:lvl5pPr>
-            <a:lvl6pPr marL="2286000" indent="0">
-              <a:buNone/>
-              <a:defRPr sz="2000"/>
+            <a:lvl6pPr marL="2122541" indent="0">
+              <a:buNone/>
+              <a:defRPr sz="1900"/>
             </a:lvl6pPr>
-            <a:lvl7pPr marL="2743200" indent="0">
-              <a:buNone/>
-              <a:defRPr sz="2000"/>
+            <a:lvl7pPr marL="2547049" indent="0">
+              <a:buNone/>
+              <a:defRPr sz="1900"/>
             </a:lvl7pPr>
-            <a:lvl8pPr marL="3200400" indent="0">
-              <a:buNone/>
-              <a:defRPr sz="2000"/>
+            <a:lvl8pPr marL="2971557" indent="0">
+              <a:buNone/>
+              <a:defRPr sz="1900"/>
             </a:lvl8pPr>
-            <a:lvl9pPr marL="3657600" indent="0">
-              <a:buNone/>
-              <a:defRPr sz="2000"/>
+            <a:lvl9pPr marL="3396065" indent="0">
+              <a:buNone/>
+              <a:defRPr sz="1900"/>
             </a:lvl9pPr>
           </a:lstStyle>
           <a:p>
@@ -2806,8 +2806,8 @@
         </p:nvSpPr>
         <p:spPr>
           <a:xfrm>
-            <a:off x="1792288" y="5367338"/>
-            <a:ext cx="5486400" cy="804862"/>
+            <a:off x="1792288" y="4472782"/>
+            <a:ext cx="5486400" cy="670718"/>
           </a:xfrm>
         </p:spPr>
         <p:txBody>
@@ -2815,37 +2815,37 @@
           <a:lstStyle>
             <a:lvl1pPr marL="0" indent="0">
               <a:buNone/>
-              <a:defRPr sz="1400"/>
+              <a:defRPr sz="1300"/>
             </a:lvl1pPr>
-            <a:lvl2pPr marL="457200" indent="0">
-              <a:buNone/>
-              <a:defRPr sz="1200"/>
+            <a:lvl2pPr marL="424508" indent="0">
+              <a:buNone/>
+              <a:defRPr sz="1100"/>
             </a:lvl2pPr>
-            <a:lvl3pPr marL="914400" indent="0">
-              <a:buNone/>
-              <a:defRPr sz="1000"/>
+            <a:lvl3pPr marL="849017" indent="0">
+              <a:buNone/>
+              <a:defRPr sz="900"/>
             </a:lvl3pPr>
-            <a:lvl4pPr marL="1371600" indent="0">
+            <a:lvl4pPr marL="1273525" indent="0">
               <a:buNone/>
               <a:defRPr sz="900"/>
             </a:lvl4pPr>
-            <a:lvl5pPr marL="1828800" indent="0">
+            <a:lvl5pPr marL="1698033" indent="0">
               <a:buNone/>
               <a:defRPr sz="900"/>
             </a:lvl5pPr>
-            <a:lvl6pPr marL="2286000" indent="0">
+            <a:lvl6pPr marL="2122541" indent="0">
               <a:buNone/>
               <a:defRPr sz="900"/>
             </a:lvl6pPr>
-            <a:lvl7pPr marL="2743200" indent="0">
+            <a:lvl7pPr marL="2547049" indent="0">
               <a:buNone/>
               <a:defRPr sz="900"/>
             </a:lvl7pPr>
-            <a:lvl8pPr marL="3200400" indent="0">
+            <a:lvl8pPr marL="2971557" indent="0">
               <a:buNone/>
               <a:defRPr sz="900"/>
             </a:lvl8pPr>
-            <a:lvl9pPr marL="3657600" indent="0">
+            <a:lvl9pPr marL="3396065" indent="0">
               <a:buNone/>
               <a:defRPr sz="900"/>
             </a:lvl9pPr>
@@ -2876,7 +2876,7 @@
           <a:p>
             <a:fld id="{E1D2620B-6619-314E-A368-62BBC874E253}" type="datetimeFigureOut">
               <a:rPr lang="en-US" smtClean="0"/>
-              <a:t>3/23/2014</a:t>
+              <a:t>3/24/2014</a:t>
             </a:fld>
             <a:endParaRPr lang="en-US" dirty="0"/>
           </a:p>
@@ -2971,15 +2971,15 @@
         </p:nvSpPr>
         <p:spPr>
           <a:xfrm>
-            <a:off x="457200" y="274638"/>
-            <a:ext cx="8229600" cy="1143000"/>
+            <a:off x="457200" y="228865"/>
+            <a:ext cx="8229600" cy="952500"/>
           </a:xfrm>
           <a:prstGeom prst="rect">
             <a:avLst/>
           </a:prstGeom>
         </p:spPr>
         <p:txBody>
-          <a:bodyPr vert="horz" lIns="91440" tIns="45720" rIns="91440" bIns="45720" rtlCol="0" anchor="ctr">
+          <a:bodyPr vert="horz" lIns="84902" tIns="42451" rIns="84902" bIns="42451" rtlCol="0" anchor="ctr">
             <a:normAutofit/>
           </a:bodyPr>
           <a:lstStyle/>
@@ -3004,15 +3004,15 @@
         </p:nvSpPr>
         <p:spPr>
           <a:xfrm>
-            <a:off x="457200" y="1600200"/>
-            <a:ext cx="8229600" cy="4525963"/>
+            <a:off x="457200" y="1333501"/>
+            <a:ext cx="8229600" cy="3771636"/>
           </a:xfrm>
           <a:prstGeom prst="rect">
             <a:avLst/>
           </a:prstGeom>
         </p:spPr>
         <p:txBody>
-          <a:bodyPr vert="horz" lIns="91440" tIns="45720" rIns="91440" bIns="45720" rtlCol="0">
+          <a:bodyPr vert="horz" lIns="84902" tIns="42451" rIns="84902" bIns="42451" rtlCol="0">
             <a:normAutofit/>
           </a:bodyPr>
           <a:lstStyle/>
@@ -3066,18 +3066,18 @@
         </p:nvSpPr>
         <p:spPr>
           <a:xfrm>
-            <a:off x="457200" y="6356350"/>
-            <a:ext cx="2133600" cy="365125"/>
+            <a:off x="457200" y="5296959"/>
+            <a:ext cx="2133600" cy="304271"/>
           </a:xfrm>
           <a:prstGeom prst="rect">
             <a:avLst/>
           </a:prstGeom>
         </p:spPr>
         <p:txBody>
-          <a:bodyPr vert="horz" lIns="91440" tIns="45720" rIns="91440" bIns="45720" rtlCol="0" anchor="ctr"/>
+          <a:bodyPr vert="horz" lIns="84902" tIns="42451" rIns="84902" bIns="42451" rtlCol="0" anchor="ctr"/>
           <a:lstStyle>
             <a:lvl1pPr algn="l">
-              <a:defRPr sz="1200">
+              <a:defRPr sz="1100">
                 <a:solidFill>
                   <a:schemeClr val="tx1">
                     <a:tint val="75000"/>
@@ -3089,7 +3089,7 @@
           <a:p>
             <a:fld id="{E1D2620B-6619-314E-A368-62BBC874E253}" type="datetimeFigureOut">
               <a:rPr lang="en-US" smtClean="0"/>
-              <a:t>3/23/2014</a:t>
+              <a:t>3/24/2014</a:t>
             </a:fld>
             <a:endParaRPr lang="en-US" dirty="0"/>
           </a:p>
@@ -3107,18 +3107,18 @@
         </p:nvSpPr>
         <p:spPr>
           <a:xfrm>
-            <a:off x="3124200" y="6356350"/>
-            <a:ext cx="2895600" cy="365125"/>
+            <a:off x="3124200" y="5296959"/>
+            <a:ext cx="2895600" cy="304271"/>
           </a:xfrm>
           <a:prstGeom prst="rect">
             <a:avLst/>
           </a:prstGeom>
         </p:spPr>
         <p:txBody>
-          <a:bodyPr vert="horz" lIns="91440" tIns="45720" rIns="91440" bIns="45720" rtlCol="0" anchor="ctr"/>
+          <a:bodyPr vert="horz" lIns="84902" tIns="42451" rIns="84902" bIns="42451" rtlCol="0" anchor="ctr"/>
           <a:lstStyle>
             <a:lvl1pPr algn="ctr">
-              <a:defRPr sz="1200">
+              <a:defRPr sz="1100">
                 <a:solidFill>
                   <a:schemeClr val="tx1">
                     <a:tint val="75000"/>
@@ -3144,18 +3144,18 @@
         </p:nvSpPr>
         <p:spPr>
           <a:xfrm>
-            <a:off x="6553200" y="6356350"/>
-            <a:ext cx="2133600" cy="365125"/>
+            <a:off x="6553200" y="5296959"/>
+            <a:ext cx="2133600" cy="304271"/>
           </a:xfrm>
           <a:prstGeom prst="rect">
             <a:avLst/>
           </a:prstGeom>
         </p:spPr>
         <p:txBody>
-          <a:bodyPr vert="horz" lIns="91440" tIns="45720" rIns="91440" bIns="45720" rtlCol="0" anchor="ctr"/>
+          <a:bodyPr vert="horz" lIns="84902" tIns="42451" rIns="84902" bIns="42451" rtlCol="0" anchor="ctr"/>
           <a:lstStyle>
             <a:lvl1pPr algn="r">
-              <a:defRPr sz="1200">
+              <a:defRPr sz="1100">
                 <a:solidFill>
                   <a:schemeClr val="tx1">
                     <a:tint val="75000"/>
@@ -3196,12 +3196,12 @@
   </p:sldLayoutIdLst>
   <p:txStyles>
     <p:titleStyle>
-      <a:lvl1pPr algn="ctr" defTabSz="457200" rtl="0" eaLnBrk="1" latinLnBrk="0" hangingPunct="1">
+      <a:lvl1pPr algn="ctr" defTabSz="424508" rtl="0" eaLnBrk="1" latinLnBrk="0" hangingPunct="1">
         <a:spcBef>
           <a:spcPct val="0"/>
         </a:spcBef>
         <a:buNone/>
-        <a:defRPr sz="4400" kern="1200">
+        <a:defRPr sz="4100" kern="1200">
           <a:solidFill>
             <a:schemeClr val="tx1"/>
           </a:solidFill>
@@ -3212,13 +3212,13 @@
       </a:lvl1pPr>
     </p:titleStyle>
     <p:bodyStyle>
-      <a:lvl1pPr marL="342900" indent="-342900" algn="l" defTabSz="457200" rtl="0" eaLnBrk="1" latinLnBrk="0" hangingPunct="1">
+      <a:lvl1pPr marL="318381" indent="-318381" algn="l" defTabSz="424508" rtl="0" eaLnBrk="1" latinLnBrk="0" hangingPunct="1">
         <a:spcBef>
           <a:spcPct val="20000"/>
         </a:spcBef>
         <a:buFont typeface="Arial"/>
         <a:buChar char="•"/>
-        <a:defRPr sz="3200" kern="1200">
+        <a:defRPr sz="3000" kern="1200">
           <a:solidFill>
             <a:schemeClr val="tx1"/>
           </a:solidFill>
@@ -3227,13 +3227,13 @@
           <a:cs typeface="+mn-cs"/>
         </a:defRPr>
       </a:lvl1pPr>
-      <a:lvl2pPr marL="742950" indent="-285750" algn="l" defTabSz="457200" rtl="0" eaLnBrk="1" latinLnBrk="0" hangingPunct="1">
+      <a:lvl2pPr marL="689826" indent="-265317" algn="l" defTabSz="424508" rtl="0" eaLnBrk="1" latinLnBrk="0" hangingPunct="1">
         <a:spcBef>
           <a:spcPct val="20000"/>
         </a:spcBef>
         <a:buFont typeface="Arial"/>
         <a:buChar char="–"/>
-        <a:defRPr sz="2800" kern="1200">
+        <a:defRPr sz="2600" kern="1200">
           <a:solidFill>
             <a:schemeClr val="tx1"/>
           </a:solidFill>
@@ -3242,13 +3242,13 @@
           <a:cs typeface="+mn-cs"/>
         </a:defRPr>
       </a:lvl2pPr>
-      <a:lvl3pPr marL="1143000" indent="-228600" algn="l" defTabSz="457200" rtl="0" eaLnBrk="1" latinLnBrk="0" hangingPunct="1">
+      <a:lvl3pPr marL="1061271" indent="-212254" algn="l" defTabSz="424508" rtl="0" eaLnBrk="1" latinLnBrk="0" hangingPunct="1">
         <a:spcBef>
           <a:spcPct val="20000"/>
         </a:spcBef>
         <a:buFont typeface="Arial"/>
         <a:buChar char="•"/>
-        <a:defRPr sz="2400" kern="1200">
+        <a:defRPr sz="2300" kern="1200">
           <a:solidFill>
             <a:schemeClr val="tx1"/>
           </a:solidFill>
@@ -3257,13 +3257,13 @@
           <a:cs typeface="+mn-cs"/>
         </a:defRPr>
       </a:lvl3pPr>
-      <a:lvl4pPr marL="1600200" indent="-228600" algn="l" defTabSz="457200" rtl="0" eaLnBrk="1" latinLnBrk="0" hangingPunct="1">
+      <a:lvl4pPr marL="1485779" indent="-212254" algn="l" defTabSz="424508" rtl="0" eaLnBrk="1" latinLnBrk="0" hangingPunct="1">
         <a:spcBef>
           <a:spcPct val="20000"/>
         </a:spcBef>
         <a:buFont typeface="Arial"/>
         <a:buChar char="–"/>
-        <a:defRPr sz="2000" kern="1200">
+        <a:defRPr sz="1900" kern="1200">
           <a:solidFill>
             <a:schemeClr val="tx1"/>
           </a:solidFill>
@@ -3272,13 +3272,13 @@
           <a:cs typeface="+mn-cs"/>
         </a:defRPr>
       </a:lvl4pPr>
-      <a:lvl5pPr marL="2057400" indent="-228600" algn="l" defTabSz="457200" rtl="0" eaLnBrk="1" latinLnBrk="0" hangingPunct="1">
+      <a:lvl5pPr marL="1910287" indent="-212254" algn="l" defTabSz="424508" rtl="0" eaLnBrk="1" latinLnBrk="0" hangingPunct="1">
         <a:spcBef>
           <a:spcPct val="20000"/>
         </a:spcBef>
         <a:buFont typeface="Arial"/>
         <a:buChar char="»"/>
-        <a:defRPr sz="2000" kern="1200">
+        <a:defRPr sz="1900" kern="1200">
           <a:solidFill>
             <a:schemeClr val="tx1"/>
           </a:solidFill>
@@ -3287,13 +3287,13 @@
           <a:cs typeface="+mn-cs"/>
         </a:defRPr>
       </a:lvl5pPr>
-      <a:lvl6pPr marL="2514600" indent="-228600" algn="l" defTabSz="457200" rtl="0" eaLnBrk="1" latinLnBrk="0" hangingPunct="1">
+      <a:lvl6pPr marL="2334795" indent="-212254" algn="l" defTabSz="424508" rtl="0" eaLnBrk="1" latinLnBrk="0" hangingPunct="1">
         <a:spcBef>
           <a:spcPct val="20000"/>
         </a:spcBef>
         <a:buFont typeface="Arial"/>
         <a:buChar char="•"/>
-        <a:defRPr sz="2000" kern="1200">
+        <a:defRPr sz="1900" kern="1200">
           <a:solidFill>
             <a:schemeClr val="tx1"/>
           </a:solidFill>
@@ -3302,13 +3302,13 @@
           <a:cs typeface="+mn-cs"/>
         </a:defRPr>
       </a:lvl6pPr>
-      <a:lvl7pPr marL="2971800" indent="-228600" algn="l" defTabSz="457200" rtl="0" eaLnBrk="1" latinLnBrk="0" hangingPunct="1">
+      <a:lvl7pPr marL="2759303" indent="-212254" algn="l" defTabSz="424508" rtl="0" eaLnBrk="1" latinLnBrk="0" hangingPunct="1">
         <a:spcBef>
           <a:spcPct val="20000"/>
         </a:spcBef>
         <a:buFont typeface="Arial"/>
         <a:buChar char="•"/>
-        <a:defRPr sz="2000" kern="1200">
+        <a:defRPr sz="1900" kern="1200">
           <a:solidFill>
             <a:schemeClr val="tx1"/>
           </a:solidFill>
@@ -3317,13 +3317,13 @@
           <a:cs typeface="+mn-cs"/>
         </a:defRPr>
       </a:lvl7pPr>
-      <a:lvl8pPr marL="3429000" indent="-228600" algn="l" defTabSz="457200" rtl="0" eaLnBrk="1" latinLnBrk="0" hangingPunct="1">
+      <a:lvl8pPr marL="3183811" indent="-212254" algn="l" defTabSz="424508" rtl="0" eaLnBrk="1" latinLnBrk="0" hangingPunct="1">
         <a:spcBef>
           <a:spcPct val="20000"/>
         </a:spcBef>
         <a:buFont typeface="Arial"/>
         <a:buChar char="•"/>
-        <a:defRPr sz="2000" kern="1200">
+        <a:defRPr sz="1900" kern="1200">
           <a:solidFill>
             <a:schemeClr val="tx1"/>
           </a:solidFill>
@@ -3332,13 +3332,13 @@
           <a:cs typeface="+mn-cs"/>
         </a:defRPr>
       </a:lvl8pPr>
-      <a:lvl9pPr marL="3886200" indent="-228600" algn="l" defTabSz="457200" rtl="0" eaLnBrk="1" latinLnBrk="0" hangingPunct="1">
+      <a:lvl9pPr marL="3608320" indent="-212254" algn="l" defTabSz="424508" rtl="0" eaLnBrk="1" latinLnBrk="0" hangingPunct="1">
         <a:spcBef>
           <a:spcPct val="20000"/>
         </a:spcBef>
         <a:buFont typeface="Arial"/>
         <a:buChar char="•"/>
-        <a:defRPr sz="2000" kern="1200">
+        <a:defRPr sz="1900" kern="1200">
           <a:solidFill>
             <a:schemeClr val="tx1"/>
           </a:solidFill>
@@ -3352,8 +3352,8 @@
       <a:defPPr>
         <a:defRPr lang="en-US"/>
       </a:defPPr>
-      <a:lvl1pPr marL="0" algn="l" defTabSz="457200" rtl="0" eaLnBrk="1" latinLnBrk="0" hangingPunct="1">
-        <a:defRPr sz="1800" kern="1200">
+      <a:lvl1pPr marL="0" algn="l" defTabSz="424508" rtl="0" eaLnBrk="1" latinLnBrk="0" hangingPunct="1">
+        <a:defRPr sz="1700" kern="1200">
           <a:solidFill>
             <a:schemeClr val="tx1"/>
           </a:solidFill>
@@ -3362,8 +3362,8 @@
           <a:cs typeface="+mn-cs"/>
         </a:defRPr>
       </a:lvl1pPr>
-      <a:lvl2pPr marL="457200" algn="l" defTabSz="457200" rtl="0" eaLnBrk="1" latinLnBrk="0" hangingPunct="1">
-        <a:defRPr sz="1800" kern="1200">
+      <a:lvl2pPr marL="424508" algn="l" defTabSz="424508" rtl="0" eaLnBrk="1" latinLnBrk="0" hangingPunct="1">
+        <a:defRPr sz="1700" kern="1200">
           <a:solidFill>
             <a:schemeClr val="tx1"/>
           </a:solidFill>
@@ -3372,8 +3372,8 @@
           <a:cs typeface="+mn-cs"/>
         </a:defRPr>
       </a:lvl2pPr>
-      <a:lvl3pPr marL="914400" algn="l" defTabSz="457200" rtl="0" eaLnBrk="1" latinLnBrk="0" hangingPunct="1">
-        <a:defRPr sz="1800" kern="1200">
+      <a:lvl3pPr marL="849017" algn="l" defTabSz="424508" rtl="0" eaLnBrk="1" latinLnBrk="0" hangingPunct="1">
+        <a:defRPr sz="1700" kern="1200">
           <a:solidFill>
             <a:schemeClr val="tx1"/>
           </a:solidFill>
@@ -3382,8 +3382,8 @@
           <a:cs typeface="+mn-cs"/>
         </a:defRPr>
       </a:lvl3pPr>
-      <a:lvl4pPr marL="1371600" algn="l" defTabSz="457200" rtl="0" eaLnBrk="1" latinLnBrk="0" hangingPunct="1">
-        <a:defRPr sz="1800" kern="1200">
+      <a:lvl4pPr marL="1273525" algn="l" defTabSz="424508" rtl="0" eaLnBrk="1" latinLnBrk="0" hangingPunct="1">
+        <a:defRPr sz="1700" kern="1200">
           <a:solidFill>
             <a:schemeClr val="tx1"/>
           </a:solidFill>
@@ -3392,8 +3392,8 @@
           <a:cs typeface="+mn-cs"/>
         </a:defRPr>
       </a:lvl4pPr>
-      <a:lvl5pPr marL="1828800" algn="l" defTabSz="457200" rtl="0" eaLnBrk="1" latinLnBrk="0" hangingPunct="1">
-        <a:defRPr sz="1800" kern="1200">
+      <a:lvl5pPr marL="1698033" algn="l" defTabSz="424508" rtl="0" eaLnBrk="1" latinLnBrk="0" hangingPunct="1">
+        <a:defRPr sz="1700" kern="1200">
           <a:solidFill>
             <a:schemeClr val="tx1"/>
           </a:solidFill>
@@ -3402,8 +3402,8 @@
           <a:cs typeface="+mn-cs"/>
         </a:defRPr>
       </a:lvl5pPr>
-      <a:lvl6pPr marL="2286000" algn="l" defTabSz="457200" rtl="0" eaLnBrk="1" latinLnBrk="0" hangingPunct="1">
-        <a:defRPr sz="1800" kern="1200">
+      <a:lvl6pPr marL="2122541" algn="l" defTabSz="424508" rtl="0" eaLnBrk="1" latinLnBrk="0" hangingPunct="1">
+        <a:defRPr sz="1700" kern="1200">
           <a:solidFill>
             <a:schemeClr val="tx1"/>
           </a:solidFill>
@@ -3412,8 +3412,8 @@
           <a:cs typeface="+mn-cs"/>
         </a:defRPr>
       </a:lvl6pPr>
-      <a:lvl7pPr marL="2743200" algn="l" defTabSz="457200" rtl="0" eaLnBrk="1" latinLnBrk="0" hangingPunct="1">
-        <a:defRPr sz="1800" kern="1200">
+      <a:lvl7pPr marL="2547049" algn="l" defTabSz="424508" rtl="0" eaLnBrk="1" latinLnBrk="0" hangingPunct="1">
+        <a:defRPr sz="1700" kern="1200">
           <a:solidFill>
             <a:schemeClr val="tx1"/>
           </a:solidFill>
@@ -3422,8 +3422,8 @@
           <a:cs typeface="+mn-cs"/>
         </a:defRPr>
       </a:lvl7pPr>
-      <a:lvl8pPr marL="3200400" algn="l" defTabSz="457200" rtl="0" eaLnBrk="1" latinLnBrk="0" hangingPunct="1">
-        <a:defRPr sz="1800" kern="1200">
+      <a:lvl8pPr marL="2971557" algn="l" defTabSz="424508" rtl="0" eaLnBrk="1" latinLnBrk="0" hangingPunct="1">
+        <a:defRPr sz="1700" kern="1200">
           <a:solidFill>
             <a:schemeClr val="tx1"/>
           </a:solidFill>
@@ -3432,8 +3432,8 @@
           <a:cs typeface="+mn-cs"/>
         </a:defRPr>
       </a:lvl8pPr>
-      <a:lvl9pPr marL="3657600" algn="l" defTabSz="457200" rtl="0" eaLnBrk="1" latinLnBrk="0" hangingPunct="1">
-        <a:defRPr sz="1800" kern="1200">
+      <a:lvl9pPr marL="3396065" algn="l" defTabSz="424508" rtl="0" eaLnBrk="1" latinLnBrk="0" hangingPunct="1">
+        <a:defRPr sz="1700" kern="1200">
           <a:solidFill>
             <a:schemeClr val="tx1"/>
           </a:solidFill>
@@ -3472,8 +3472,8 @@
         </p:nvSpPr>
         <p:spPr>
           <a:xfrm>
-            <a:off x="1106071" y="608063"/>
-            <a:ext cx="2740104" cy="1565838"/>
+            <a:off x="2941059" y="2194880"/>
+            <a:ext cx="1877814" cy="1991500"/>
           </a:xfrm>
           <a:prstGeom prst="roundRect">
             <a:avLst/>
@@ -3494,24 +3494,55 @@
           </a:fontRef>
         </p:style>
         <p:txBody>
-          <a:bodyPr rtlCol="0" anchor="ctr"/>
+          <a:bodyPr lIns="84902" tIns="42451" rIns="84902" bIns="42451" rtlCol="0" anchor="ctr"/>
           <a:lstStyle/>
           <a:p>
             <a:pPr algn="ctr"/>
-            <a:endParaRPr lang="en-US" dirty="0"/>
-          </a:p>
-        </p:txBody>
-      </p:sp>
-      <p:sp>
-        <p:nvSpPr>
-          <p:cNvPr id="5" name="Rectangle 4"/>
+            <a:endParaRPr lang="en-US" sz="1050" b="1" dirty="0"/>
+          </a:p>
+        </p:txBody>
+      </p:sp>
+      <p:cxnSp>
+        <p:nvCxnSpPr>
+          <p:cNvPr id="5" name="Straight Connector 4"/>
+          <p:cNvCxnSpPr/>
+          <p:nvPr/>
+        </p:nvCxnSpPr>
+        <p:spPr>
+          <a:xfrm flipV="1">
+            <a:off x="2941059" y="2571784"/>
+            <a:ext cx="1877814" cy="5306"/>
+          </a:xfrm>
+          <a:prstGeom prst="line">
+            <a:avLst/>
+          </a:prstGeom>
+          <a:effectLst/>
+        </p:spPr>
+        <p:style>
+          <a:lnRef idx="2">
+            <a:schemeClr val="dk1"/>
+          </a:lnRef>
+          <a:fillRef idx="0">
+            <a:schemeClr val="dk1"/>
+          </a:fillRef>
+          <a:effectRef idx="1">
+            <a:schemeClr val="dk1"/>
+          </a:effectRef>
+          <a:fontRef idx="minor">
+            <a:schemeClr val="tx1"/>
+          </a:fontRef>
+        </p:style>
+      </p:cxnSp>
+      <p:sp>
+        <p:nvSpPr>
+          <p:cNvPr id="6" name="Rectangle 5"/>
           <p:cNvSpPr/>
           <p:nvPr/>
         </p:nvSpPr>
         <p:spPr>
           <a:xfrm>
-            <a:off x="1106071" y="1082196"/>
-            <a:ext cx="2740104" cy="1186708"/>
+            <a:off x="2981587" y="2163624"/>
+            <a:ext cx="1655301" cy="467035"/>
           </a:xfrm>
           <a:prstGeom prst="rect">
             <a:avLst/>
@@ -3536,79 +3567,19 @@
           </a:fontRef>
         </p:style>
         <p:txBody>
-          <a:bodyPr rtlCol="0" anchor="t"/>
-          <a:lstStyle/>
-          <a:p>
-            <a:r>
-              <a:rPr lang="it-IT" sz="1000" dirty="0"/>
-              <a:t>- JButton localGameButton</a:t>
-            </a:r>
-          </a:p>
-          <a:p>
-            <a:r>
-              <a:rPr lang="it-IT" sz="1000" dirty="0"/>
-              <a:t>- JButton remoteGameButton</a:t>
-            </a:r>
-          </a:p>
-          <a:p>
-            <a:r>
-              <a:rPr lang="it-IT" sz="1000" dirty="0"/>
-              <a:t>- Controller controller</a:t>
-            </a:r>
-          </a:p>
-          <a:p>
-            <a:r>
-              <a:rPr lang="en-US" sz="1000" dirty="0" smtClean="0">
-                <a:latin typeface="Monaco"/>
+          <a:bodyPr lIns="84902" tIns="42451" rIns="84902" bIns="42451" rtlCol="0" anchor="ctr"/>
+          <a:lstStyle/>
+          <a:p>
+            <a:pPr algn="ctr"/>
+            <a:r>
+              <a:rPr lang="en-US" sz="1050" b="1" dirty="0" smtClean="0">
                 <a:cs typeface="Monaco"/>
               </a:rPr>
-              <a:t>⎯⎯⎯⎯⎯⎯⎯⎯⎯⎯⎯⎯⎯⎯⎯⎯</a:t>
-            </a:r>
-            <a:endParaRPr lang="en-US" sz="1000" dirty="0" smtClean="0">
-              <a:latin typeface="Monaco"/>
+              <a:t>MainMenuPanel</a:t>
+            </a:r>
+            <a:endParaRPr lang="en-US" sz="1050" b="1" dirty="0">
               <a:cs typeface="Monaco"/>
             </a:endParaRPr>
-          </a:p>
-          <a:p>
-            <a:r>
-              <a:rPr lang="tr-TR" sz="1000" dirty="0"/>
-              <a:t>+ </a:t>
-            </a:r>
-            <a:r>
-              <a:rPr lang="tr-TR" sz="1000" dirty="0" err="1"/>
-              <a:t>MainMenuPanel</a:t>
-            </a:r>
-            <a:r>
-              <a:rPr lang="tr-TR" sz="1000" dirty="0"/>
-              <a:t>(Controller):&lt;</a:t>
-            </a:r>
-            <a:r>
-              <a:rPr lang="tr-TR" sz="1000" dirty="0" err="1"/>
-              <a:t>constructor</a:t>
-            </a:r>
-            <a:r>
-              <a:rPr lang="tr-TR" sz="1000" dirty="0"/>
-              <a:t>&gt;</a:t>
-            </a:r>
-          </a:p>
-          <a:p>
-            <a:r>
-              <a:rPr lang="tr-TR" sz="1000" dirty="0"/>
-              <a:t>- </a:t>
-            </a:r>
-            <a:r>
-              <a:rPr lang="tr-TR" sz="1000" dirty="0" err="1"/>
-              <a:t>createButtons</a:t>
-            </a:r>
-            <a:r>
-              <a:rPr lang="tr-TR" sz="1000" dirty="0"/>
-              <a:t>():</a:t>
-            </a:r>
-            <a:r>
-              <a:rPr lang="tr-TR" sz="1000" dirty="0" err="1"/>
-              <a:t>void</a:t>
-            </a:r>
-            <a:endParaRPr lang="tr-TR" sz="1000" dirty="0"/>
           </a:p>
         </p:txBody>
       </p:sp>
@@ -3620,8 +3591,8 @@
         </p:nvSpPr>
         <p:spPr>
           <a:xfrm>
-            <a:off x="1106071" y="608062"/>
-            <a:ext cx="2740104" cy="457200"/>
+            <a:off x="3005506" y="2605463"/>
+            <a:ext cx="1832262" cy="1744684"/>
           </a:xfrm>
           <a:prstGeom prst="rect">
             <a:avLst/>
@@ -3646,55 +3617,58 @@
           </a:fontRef>
         </p:style>
         <p:txBody>
-          <a:bodyPr rtlCol="0" anchor="ctr"/>
-          <a:lstStyle/>
-          <a:p>
-            <a:pPr algn="ctr"/>
-            <a:r>
-              <a:rPr lang="tr-TR" dirty="0" err="1" smtClean="0">
-                <a:latin typeface="Monaco"/>
+          <a:bodyPr lIns="84902" tIns="42451" rIns="84902" bIns="42451" rtlCol="0" anchor="t"/>
+          <a:lstStyle/>
+          <a:p>
+            <a:r>
+              <a:rPr lang="en-US" sz="1050" b="1" dirty="0">
                 <a:cs typeface="Monaco"/>
               </a:rPr>
-              <a:t>MainMenuPanel</a:t>
-            </a:r>
-            <a:endParaRPr lang="en-US" dirty="0">
-              <a:latin typeface="Monaco"/>
-              <a:cs typeface="Monaco"/>
-            </a:endParaRPr>
-          </a:p>
-        </p:txBody>
-      </p:sp>
-      <p:cxnSp>
-        <p:nvCxnSpPr>
-          <p:cNvPr id="8" name="Straight Connector 7"/>
-          <p:cNvCxnSpPr/>
-          <p:nvPr/>
-        </p:nvCxnSpPr>
-        <p:spPr>
-          <a:xfrm>
-            <a:off x="1109326" y="1065262"/>
-            <a:ext cx="2736849" cy="0"/>
-          </a:xfrm>
-          <a:prstGeom prst="line">
-            <a:avLst/>
-          </a:prstGeom>
-          <a:effectLst/>
-        </p:spPr>
-        <p:style>
-          <a:lnRef idx="2">
-            <a:schemeClr val="dk1"/>
-          </a:lnRef>
-          <a:fillRef idx="0">
-            <a:schemeClr val="dk1"/>
-          </a:fillRef>
-          <a:effectRef idx="1">
-            <a:schemeClr val="dk1"/>
-          </a:effectRef>
-          <a:fontRef idx="minor">
-            <a:schemeClr val="tx1"/>
-          </a:fontRef>
-        </p:style>
-      </p:cxnSp>
+              <a:t>- JButton localGameButton</a:t>
+            </a:r>
+          </a:p>
+          <a:p>
+            <a:r>
+              <a:rPr lang="en-US" sz="1050" b="1" dirty="0">
+                <a:cs typeface="Monaco"/>
+              </a:rPr>
+              <a:t>- JButton remoteGameButton</a:t>
+            </a:r>
+          </a:p>
+          <a:p>
+            <a:r>
+              <a:rPr lang="en-US" sz="1050" b="1" dirty="0">
+                <a:cs typeface="Monaco"/>
+              </a:rPr>
+              <a:t>- Controller controller</a:t>
+            </a:r>
+          </a:p>
+          <a:p>
+            <a:r>
+              <a:rPr lang="en-US" sz="1050" b="1" dirty="0">
+                <a:cs typeface="Monaco"/>
+              </a:rPr>
+              <a:t>⎯⎯⎯⎯⎯⎯⎯⎯⎯⎯⎯⎯⎯⎯⎯⎯</a:t>
+            </a:r>
+          </a:p>
+          <a:p>
+            <a:r>
+              <a:rPr lang="en-US" sz="1050" b="1" dirty="0">
+                <a:cs typeface="Monaco"/>
+              </a:rPr>
+              <a:t>+ MainMenuPanel(Controller): 	&lt;constructor&gt;</a:t>
+            </a:r>
+          </a:p>
+          <a:p>
+            <a:r>
+              <a:rPr lang="en-US" sz="1050" b="1" dirty="0">
+                <a:cs typeface="Monaco"/>
+              </a:rPr>
+              <a:t>- createButtons(): void</a:t>
+            </a:r>
+          </a:p>
+        </p:txBody>
+      </p:sp>
       <p:sp>
         <p:nvSpPr>
           <p:cNvPr id="9" name="Rounded Rectangle 8"/>
@@ -3703,8 +3677,8 @@
         </p:nvSpPr>
         <p:spPr>
           <a:xfrm>
-            <a:off x="4945744" y="548574"/>
-            <a:ext cx="2971756" cy="1684865"/>
+            <a:off x="5029095" y="890851"/>
+            <a:ext cx="1770634" cy="462976"/>
           </a:xfrm>
           <a:prstGeom prst="roundRect">
             <a:avLst/>
@@ -3725,24 +3699,24 @@
           </a:fontRef>
         </p:style>
         <p:txBody>
-          <a:bodyPr rtlCol="0" anchor="ctr"/>
+          <a:bodyPr lIns="84902" tIns="42451" rIns="84902" bIns="42451" rtlCol="0" anchor="ctr"/>
           <a:lstStyle/>
           <a:p>
             <a:pPr algn="ctr"/>
-            <a:endParaRPr lang="en-US" dirty="0"/>
-          </a:p>
-        </p:txBody>
-      </p:sp>
-      <p:sp>
-        <p:nvSpPr>
-          <p:cNvPr id="10" name="Rectangle 9"/>
+            <a:endParaRPr lang="en-US" sz="1050" b="1" dirty="0"/>
+          </a:p>
+        </p:txBody>
+      </p:sp>
+      <p:sp>
+        <p:nvSpPr>
+          <p:cNvPr id="11" name="Rectangle 10"/>
           <p:cNvSpPr/>
           <p:nvPr/>
         </p:nvSpPr>
         <p:spPr>
           <a:xfrm>
-            <a:off x="4945744" y="1022707"/>
-            <a:ext cx="2971756" cy="1227666"/>
+            <a:off x="5406297" y="903389"/>
+            <a:ext cx="915544" cy="443263"/>
           </a:xfrm>
           <a:prstGeom prst="rect">
             <a:avLst/>
@@ -3767,106 +3741,32 @@
           </a:fontRef>
         </p:style>
         <p:txBody>
-          <a:bodyPr rtlCol="0" anchor="t"/>
-          <a:lstStyle/>
-          <a:p>
-            <a:r>
-              <a:rPr lang="it-IT" sz="1000" dirty="0"/>
-              <a:t>- JButton hostGameButton</a:t>
-            </a:r>
-          </a:p>
-          <a:p>
-            <a:r>
-              <a:rPr lang="it-IT" sz="1000" dirty="0"/>
-              <a:t>- JButton joinGameButton </a:t>
-            </a:r>
-            <a:r>
-              <a:rPr lang="tr-TR" sz="1000" dirty="0" smtClean="0"/>
-              <a:t/>
-            </a:r>
-            <a:br>
-              <a:rPr lang="tr-TR" sz="1000" dirty="0" smtClean="0"/>
-            </a:br>
-            <a:r>
-              <a:rPr lang="it-IT" sz="1000" dirty="0" smtClean="0"/>
-              <a:t>- </a:t>
-            </a:r>
-            <a:r>
-              <a:rPr lang="it-IT" sz="1000" dirty="0"/>
-              <a:t>Controller controller</a:t>
-            </a:r>
-            <a:endParaRPr lang="it-IT" sz="1000" dirty="0"/>
-          </a:p>
-          <a:p>
-            <a:r>
-              <a:rPr lang="en-US" sz="1000" dirty="0" smtClean="0">
-                <a:latin typeface="Monaco"/>
+          <a:bodyPr lIns="84902" tIns="42451" rIns="84902" bIns="42451" rtlCol="0" anchor="ctr"/>
+          <a:lstStyle/>
+          <a:p>
+            <a:pPr algn="ctr"/>
+            <a:r>
+              <a:rPr lang="en-US" sz="1050" b="1" dirty="0" smtClean="0">
                 <a:cs typeface="Monaco"/>
               </a:rPr>
-              <a:t>⎯⎯⎯⎯⎯⎯⎯⎯⎯⎯⎯⎯⎯⎯⎯⎯</a:t>
-            </a:r>
-            <a:endParaRPr lang="en-US" sz="1000" dirty="0" smtClean="0">
-              <a:latin typeface="Monaco"/>
+              <a:t>JPanel</a:t>
+            </a:r>
+            <a:endParaRPr lang="en-US" sz="1050" b="1" dirty="0">
               <a:cs typeface="Monaco"/>
             </a:endParaRPr>
           </a:p>
-          <a:p>
-            <a:r>
-              <a:rPr lang="tr-TR" sz="1000" dirty="0" smtClean="0"/>
-              <a:t>+</a:t>
-            </a:r>
-            <a:r>
-              <a:rPr lang="tr-TR" sz="1000" dirty="0" err="1" smtClean="0"/>
-              <a:t>RemoteGameChoicePanel</a:t>
-            </a:r>
-            <a:r>
-              <a:rPr lang="tr-TR" sz="1000" dirty="0" smtClean="0"/>
-              <a:t>(Controller</a:t>
-            </a:r>
-            <a:r>
-              <a:rPr lang="tr-TR" sz="1000" dirty="0"/>
-              <a:t>):&lt;</a:t>
-            </a:r>
-            <a:r>
-              <a:rPr lang="tr-TR" sz="1000" dirty="0" err="1"/>
-              <a:t>constructor</a:t>
-            </a:r>
-            <a:r>
-              <a:rPr lang="tr-TR" sz="1000" dirty="0"/>
-              <a:t>&gt;</a:t>
-            </a:r>
-          </a:p>
-          <a:p>
-            <a:r>
-              <a:rPr lang="tr-TR" sz="1000" dirty="0"/>
-              <a:t>- </a:t>
-            </a:r>
-            <a:r>
-              <a:rPr lang="tr-TR" sz="1000" dirty="0" err="1"/>
-              <a:t>createButtons</a:t>
-            </a:r>
-            <a:r>
-              <a:rPr lang="tr-TR" sz="1000" dirty="0"/>
-              <a:t>():</a:t>
-            </a:r>
-            <a:r>
-              <a:rPr lang="tr-TR" sz="1000" dirty="0" err="1"/>
-              <a:t>void</a:t>
-            </a:r>
-            <a:endParaRPr lang="tr-TR" sz="1000" dirty="0"/>
-          </a:p>
-        </p:txBody>
-      </p:sp>
-      <p:sp>
-        <p:nvSpPr>
-          <p:cNvPr id="11" name="Rectangle 10"/>
+        </p:txBody>
+      </p:sp>
+      <p:sp>
+        <p:nvSpPr>
+          <p:cNvPr id="13" name="Rectangle 12"/>
           <p:cNvSpPr/>
           <p:nvPr/>
         </p:nvSpPr>
         <p:spPr>
           <a:xfrm>
-            <a:off x="5061570" y="548572"/>
-            <a:ext cx="2740104" cy="498159"/>
+            <a:off x="5029095" y="441466"/>
+            <a:ext cx="1657016" cy="488548"/>
           </a:xfrm>
           <a:prstGeom prst="rect">
             <a:avLst/>
@@ -3891,19 +3791,17 @@
           </a:fontRef>
         </p:style>
         <p:txBody>
-          <a:bodyPr rtlCol="0" anchor="ctr"/>
+          <a:bodyPr lIns="84902" tIns="42451" rIns="84902" bIns="42451" rtlCol="0" anchor="ctr"/>
           <a:lstStyle/>
           <a:p>
             <a:pPr algn="ctr"/>
             <a:r>
-              <a:rPr lang="tr-TR" dirty="0" err="1" smtClean="0">
-                <a:latin typeface="Monaco"/>
+              <a:rPr lang="en-US" sz="1050" b="1" dirty="0" smtClean="0">
                 <a:cs typeface="Monaco"/>
               </a:rPr>
-              <a:t>NetworkMenuPanel</a:t>
-            </a:r>
-            <a:endParaRPr lang="en-US" dirty="0">
-              <a:latin typeface="Monaco"/>
+              <a:t>&lt;&lt;interface&gt;&gt;</a:t>
+            </a:r>
+            <a:endParaRPr lang="en-US" sz="1050" b="1" dirty="0">
               <a:cs typeface="Monaco"/>
             </a:endParaRPr>
           </a:p>
@@ -3911,14 +3809,14 @@
       </p:sp>
       <p:cxnSp>
         <p:nvCxnSpPr>
-          <p:cNvPr id="12" name="Straight Connector 11"/>
+          <p:cNvPr id="15" name="Straight Connector 14"/>
           <p:cNvCxnSpPr/>
           <p:nvPr/>
         </p:nvCxnSpPr>
         <p:spPr>
           <a:xfrm>
-            <a:off x="4948999" y="1005773"/>
-            <a:ext cx="2968501" cy="0"/>
+            <a:off x="5914412" y="1612463"/>
+            <a:ext cx="0" cy="329140"/>
           </a:xfrm>
           <a:prstGeom prst="line">
             <a:avLst/>
@@ -3942,14 +3840,55 @@
       </p:cxnSp>
       <p:sp>
         <p:nvSpPr>
-          <p:cNvPr id="16" name="Rounded Rectangle 15"/>
+          <p:cNvPr id="19" name="Isosceles Triangle 18"/>
           <p:cNvSpPr/>
           <p:nvPr/>
         </p:nvSpPr>
         <p:spPr>
           <a:xfrm>
-            <a:off x="1102816" y="3458644"/>
-            <a:ext cx="2740104" cy="1565838"/>
+            <a:off x="5780832" y="1362398"/>
+            <a:ext cx="246516" cy="253466"/>
+          </a:xfrm>
+          <a:prstGeom prst="triangle">
+            <a:avLst/>
+          </a:prstGeom>
+          <a:noFill/>
+        </p:spPr>
+        <p:style>
+          <a:lnRef idx="2">
+            <a:schemeClr val="dk1">
+              <a:shade val="50000"/>
+            </a:schemeClr>
+          </a:lnRef>
+          <a:fillRef idx="1">
+            <a:schemeClr val="dk1"/>
+          </a:fillRef>
+          <a:effectRef idx="0">
+            <a:schemeClr val="dk1"/>
+          </a:effectRef>
+          <a:fontRef idx="minor">
+            <a:schemeClr val="lt1"/>
+          </a:fontRef>
+        </p:style>
+        <p:txBody>
+          <a:bodyPr lIns="84902" tIns="42451" rIns="84902" bIns="42451" spcCol="0" rtlCol="0" anchor="ctr"/>
+          <a:lstStyle/>
+          <a:p>
+            <a:pPr algn="ctr"/>
+            <a:endParaRPr lang="en-US" sz="1050" b="1" dirty="0"/>
+          </a:p>
+        </p:txBody>
+      </p:sp>
+      <p:sp>
+        <p:nvSpPr>
+          <p:cNvPr id="22" name="Rounded Rectangle 21"/>
+          <p:cNvSpPr/>
+          <p:nvPr/>
+        </p:nvSpPr>
+        <p:spPr>
+          <a:xfrm>
+            <a:off x="5062617" y="2194880"/>
+            <a:ext cx="1846649" cy="2034148"/>
           </a:xfrm>
           <a:prstGeom prst="roundRect">
             <a:avLst/>
@@ -3970,24 +3909,55 @@
           </a:fontRef>
         </p:style>
         <p:txBody>
-          <a:bodyPr rtlCol="0" anchor="ctr"/>
+          <a:bodyPr lIns="84902" tIns="42451" rIns="84902" bIns="42451" rtlCol="0" anchor="ctr"/>
           <a:lstStyle/>
           <a:p>
             <a:pPr algn="ctr"/>
-            <a:endParaRPr lang="en-US" dirty="0"/>
-          </a:p>
-        </p:txBody>
-      </p:sp>
-      <p:sp>
-        <p:nvSpPr>
-          <p:cNvPr id="17" name="Rectangle 16"/>
+            <a:endParaRPr lang="en-US" sz="1050" b="1" dirty="0"/>
+          </a:p>
+        </p:txBody>
+      </p:sp>
+      <p:cxnSp>
+        <p:nvCxnSpPr>
+          <p:cNvPr id="23" name="Straight Connector 22"/>
+          <p:cNvCxnSpPr/>
+          <p:nvPr/>
+        </p:nvCxnSpPr>
+        <p:spPr>
+          <a:xfrm>
+            <a:off x="5070427" y="2571784"/>
+            <a:ext cx="1819579" cy="5306"/>
+          </a:xfrm>
+          <a:prstGeom prst="line">
+            <a:avLst/>
+          </a:prstGeom>
+          <a:effectLst/>
+        </p:spPr>
+        <p:style>
+          <a:lnRef idx="2">
+            <a:schemeClr val="dk1"/>
+          </a:lnRef>
+          <a:fillRef idx="0">
+            <a:schemeClr val="dk1"/>
+          </a:fillRef>
+          <a:effectRef idx="1">
+            <a:schemeClr val="dk1"/>
+          </a:effectRef>
+          <a:fontRef idx="minor">
+            <a:schemeClr val="tx1"/>
+          </a:fontRef>
+        </p:style>
+      </p:cxnSp>
+      <p:sp>
+        <p:nvSpPr>
+          <p:cNvPr id="24" name="Rectangle 23"/>
           <p:cNvSpPr/>
           <p:nvPr/>
         </p:nvSpPr>
         <p:spPr>
           <a:xfrm>
-            <a:off x="1102815" y="3932777"/>
-            <a:ext cx="2930895" cy="1186708"/>
+            <a:off x="4931080" y="2145738"/>
+            <a:ext cx="1865979" cy="498860"/>
           </a:xfrm>
           <a:prstGeom prst="rect">
             <a:avLst/>
@@ -4012,91 +3982,38 @@
           </a:fontRef>
         </p:style>
         <p:txBody>
-          <a:bodyPr rtlCol="0" anchor="t"/>
-          <a:lstStyle/>
-          <a:p>
-            <a:r>
-              <a:rPr lang="tr-TR" sz="1000" dirty="0"/>
-              <a:t>- </a:t>
-            </a:r>
-            <a:r>
-              <a:rPr lang="tr-TR" sz="1000" dirty="0" err="1"/>
-              <a:t>JButton</a:t>
-            </a:r>
-            <a:r>
-              <a:rPr lang="tr-TR" sz="1000" dirty="0"/>
-              <a:t>[] </a:t>
-            </a:r>
-            <a:r>
-              <a:rPr lang="tr-TR" sz="1000" dirty="0" err="1"/>
-              <a:t>boardButtons</a:t>
-            </a:r>
-            <a:endParaRPr lang="tr-TR" sz="1000" dirty="0"/>
-          </a:p>
-          <a:p>
-            <a:r>
-              <a:rPr lang="tr-TR" sz="1000" dirty="0"/>
-              <a:t>- Controller </a:t>
-            </a:r>
-            <a:r>
-              <a:rPr lang="tr-TR" sz="1000" dirty="0" err="1"/>
-              <a:t>controller</a:t>
-            </a:r>
-            <a:endParaRPr lang="tr-TR" sz="1000" dirty="0"/>
-          </a:p>
-          <a:p>
-            <a:r>
-              <a:rPr lang="en-US" sz="1000" dirty="0" smtClean="0">
-                <a:latin typeface="Monaco"/>
+          <a:bodyPr lIns="84902" tIns="42451" rIns="84902" bIns="42451" rtlCol="0" anchor="ctr"/>
+          <a:lstStyle/>
+          <a:p>
+            <a:pPr algn="ctr"/>
+            <a:r>
+              <a:rPr lang="tr-TR" sz="1050" b="1" dirty="0" err="1" smtClean="0">
                 <a:cs typeface="Monaco"/>
               </a:rPr>
-              <a:t>⎯⎯⎯⎯⎯⎯⎯⎯⎯⎯⎯⎯⎯⎯⎯⎯</a:t>
-            </a:r>
-            <a:endParaRPr lang="en-US" sz="1000" dirty="0" smtClean="0">
-              <a:latin typeface="Monaco"/>
+              <a:t>NetworkMenu</a:t>
+            </a:r>
+            <a:r>
+              <a:rPr lang="en-US" sz="1050" b="1" dirty="0" smtClean="0">
+                <a:cs typeface="Monaco"/>
+              </a:rPr>
+              <a:t>Panel</a:t>
+            </a:r>
+            <a:endParaRPr lang="en-US" sz="1050" b="1" dirty="0">
               <a:cs typeface="Monaco"/>
             </a:endParaRPr>
           </a:p>
-          <a:p>
-            <a:r>
-              <a:rPr lang="en-US" sz="1000" dirty="0"/>
-              <a:t>+ </a:t>
-            </a:r>
-            <a:r>
-              <a:rPr lang="en-US" sz="1000" dirty="0" err="1"/>
-              <a:t>GameBoard</a:t>
-            </a:r>
-            <a:r>
-              <a:rPr lang="en-US" sz="1000" dirty="0"/>
-              <a:t>(Controller controller):&lt;constructor&gt;</a:t>
-            </a:r>
-          </a:p>
-          <a:p>
-            <a:r>
-              <a:rPr lang="en-US" sz="1000" dirty="0"/>
-              <a:t>- </a:t>
-            </a:r>
-            <a:r>
-              <a:rPr lang="en-US" sz="1000" dirty="0" err="1"/>
-              <a:t>createButtons</a:t>
-            </a:r>
-            <a:r>
-              <a:rPr lang="en-US" sz="1000" dirty="0"/>
-              <a:t>():void</a:t>
-            </a:r>
-          </a:p>
-        </p:txBody>
-      </p:sp>
-      <p:sp>
-        <p:nvSpPr>
-          <p:cNvPr id="18" name="Rectangle 17"/>
+        </p:txBody>
+      </p:sp>
+      <p:sp>
+        <p:nvSpPr>
+          <p:cNvPr id="25" name="Rectangle 24"/>
           <p:cNvSpPr/>
           <p:nvPr/>
         </p:nvSpPr>
         <p:spPr>
           <a:xfrm>
-            <a:off x="1102816" y="3458643"/>
-            <a:ext cx="2740104" cy="457200"/>
+            <a:off x="5061647" y="2690923"/>
+            <a:ext cx="1819579" cy="1473975"/>
           </a:xfrm>
           <a:prstGeom prst="rect">
             <a:avLst/>
@@ -4121,34 +4038,68 @@
           </a:fontRef>
         </p:style>
         <p:txBody>
-          <a:bodyPr rtlCol="0" anchor="ctr"/>
-          <a:lstStyle/>
-          <a:p>
-            <a:pPr algn="ctr"/>
-            <a:r>
-              <a:rPr lang="tr-TR" dirty="0" err="1">
-                <a:latin typeface="Monaco"/>
+          <a:bodyPr lIns="84902" tIns="42451" rIns="84902" bIns="42451" rtlCol="0" anchor="t"/>
+          <a:lstStyle/>
+          <a:p>
+            <a:r>
+              <a:rPr lang="en-US" sz="1050" b="1" dirty="0">
                 <a:cs typeface="Monaco"/>
               </a:rPr>
-              <a:t>GameBoard</a:t>
-            </a:r>
-            <a:endParaRPr lang="tr-TR" dirty="0">
-              <a:latin typeface="Monaco"/>
-              <a:cs typeface="Monaco"/>
-            </a:endParaRPr>
+              <a:t>- JButton localGameButton</a:t>
+            </a:r>
+          </a:p>
+          <a:p>
+            <a:r>
+              <a:rPr lang="en-US" sz="1050" b="1" dirty="0">
+                <a:cs typeface="Monaco"/>
+              </a:rPr>
+              <a:t>- JButton remoteGameButton</a:t>
+            </a:r>
+          </a:p>
+          <a:p>
+            <a:r>
+              <a:rPr lang="en-US" sz="1050" b="1" dirty="0">
+                <a:cs typeface="Monaco"/>
+              </a:rPr>
+              <a:t>- Controller controller</a:t>
+            </a:r>
+          </a:p>
+          <a:p>
+            <a:r>
+              <a:rPr lang="en-US" sz="1050" b="1" dirty="0">
+                <a:cs typeface="Monaco"/>
+              </a:rPr>
+              <a:t>⎯⎯⎯⎯⎯⎯⎯⎯⎯⎯⎯⎯⎯⎯⎯⎯</a:t>
+            </a:r>
+          </a:p>
+          <a:p>
+            <a:r>
+              <a:rPr lang="en-US" sz="1050" b="1" dirty="0">
+                <a:cs typeface="Monaco"/>
+              </a:rPr>
+              <a:t>+ MainMenuPanel(Controller): 	&lt;constructor&gt;</a:t>
+            </a:r>
+          </a:p>
+          <a:p>
+            <a:r>
+              <a:rPr lang="en-US" sz="1050" b="1" dirty="0">
+                <a:cs typeface="Monaco"/>
+              </a:rPr>
+              <a:t>- createButtons(): void</a:t>
+            </a:r>
           </a:p>
         </p:txBody>
       </p:sp>
       <p:cxnSp>
         <p:nvCxnSpPr>
-          <p:cNvPr id="19" name="Straight Connector 18"/>
+          <p:cNvPr id="27" name="Straight Connector 26"/>
           <p:cNvCxnSpPr/>
           <p:nvPr/>
         </p:nvCxnSpPr>
         <p:spPr>
           <a:xfrm>
-            <a:off x="1106071" y="3915843"/>
-            <a:ext cx="2736849" cy="0"/>
+            <a:off x="4026739" y="1925856"/>
+            <a:ext cx="3994280" cy="0"/>
           </a:xfrm>
           <a:prstGeom prst="line">
             <a:avLst/>
@@ -4170,16 +4121,78 @@
           </a:fontRef>
         </p:style>
       </p:cxnSp>
-      <p:sp>
-        <p:nvSpPr>
-          <p:cNvPr id="21" name="Rounded Rectangle 20"/>
+      <p:cxnSp>
+        <p:nvCxnSpPr>
+          <p:cNvPr id="30" name="Straight Connector 29"/>
+          <p:cNvCxnSpPr/>
+          <p:nvPr/>
+        </p:nvCxnSpPr>
+        <p:spPr>
+          <a:xfrm>
+            <a:off x="5904090" y="1925856"/>
+            <a:ext cx="0" cy="279936"/>
+          </a:xfrm>
+          <a:prstGeom prst="line">
+            <a:avLst/>
+          </a:prstGeom>
+          <a:effectLst/>
+        </p:spPr>
+        <p:style>
+          <a:lnRef idx="2">
+            <a:schemeClr val="dk1"/>
+          </a:lnRef>
+          <a:fillRef idx="0">
+            <a:schemeClr val="dk1"/>
+          </a:fillRef>
+          <a:effectRef idx="1">
+            <a:schemeClr val="dk1"/>
+          </a:effectRef>
+          <a:fontRef idx="minor">
+            <a:schemeClr val="tx1"/>
+          </a:fontRef>
+        </p:style>
+      </p:cxnSp>
+      <p:cxnSp>
+        <p:nvCxnSpPr>
+          <p:cNvPr id="44" name="Straight Connector 43"/>
+          <p:cNvCxnSpPr/>
+          <p:nvPr/>
+        </p:nvCxnSpPr>
+        <p:spPr>
+          <a:xfrm>
+            <a:off x="4026739" y="1901919"/>
+            <a:ext cx="0" cy="310696"/>
+          </a:xfrm>
+          <a:prstGeom prst="line">
+            <a:avLst/>
+          </a:prstGeom>
+          <a:effectLst/>
+        </p:spPr>
+        <p:style>
+          <a:lnRef idx="2">
+            <a:schemeClr val="dk1"/>
+          </a:lnRef>
+          <a:fillRef idx="0">
+            <a:schemeClr val="dk1"/>
+          </a:fillRef>
+          <a:effectRef idx="1">
+            <a:schemeClr val="dk1"/>
+          </a:effectRef>
+          <a:fontRef idx="minor">
+            <a:schemeClr val="tx1"/>
+          </a:fontRef>
+        </p:style>
+      </p:cxnSp>
+      <p:sp>
+        <p:nvSpPr>
+          <p:cNvPr id="46" name="Rounded Rectangle 45"/>
           <p:cNvSpPr/>
           <p:nvPr/>
         </p:nvSpPr>
         <p:spPr>
           <a:xfrm>
-            <a:off x="4936360" y="3459798"/>
-            <a:ext cx="2740104" cy="1565838"/>
+            <a:off x="7091251" y="2173076"/>
+            <a:ext cx="1852660" cy="2052699"/>
           </a:xfrm>
           <a:prstGeom prst="roundRect">
             <a:avLst/>
@@ -4200,24 +4213,55 @@
           </a:fontRef>
         </p:style>
         <p:txBody>
-          <a:bodyPr rtlCol="0" anchor="ctr"/>
+          <a:bodyPr lIns="84902" tIns="42451" rIns="84902" bIns="42451" rtlCol="0" anchor="ctr"/>
           <a:lstStyle/>
           <a:p>
             <a:pPr algn="ctr"/>
-            <a:endParaRPr lang="en-US" dirty="0"/>
-          </a:p>
-        </p:txBody>
-      </p:sp>
-      <p:sp>
-        <p:nvSpPr>
-          <p:cNvPr id="22" name="Rectangle 21"/>
+            <a:endParaRPr lang="en-US" sz="1050" b="1" dirty="0"/>
+          </a:p>
+        </p:txBody>
+      </p:sp>
+      <p:cxnSp>
+        <p:nvCxnSpPr>
+          <p:cNvPr id="47" name="Straight Connector 46"/>
+          <p:cNvCxnSpPr/>
+          <p:nvPr/>
+        </p:nvCxnSpPr>
+        <p:spPr>
+          <a:xfrm>
+            <a:off x="7091251" y="2577090"/>
+            <a:ext cx="1867511" cy="3946"/>
+          </a:xfrm>
+          <a:prstGeom prst="line">
+            <a:avLst/>
+          </a:prstGeom>
+          <a:effectLst/>
+        </p:spPr>
+        <p:style>
+          <a:lnRef idx="2">
+            <a:schemeClr val="dk1"/>
+          </a:lnRef>
+          <a:fillRef idx="0">
+            <a:schemeClr val="dk1"/>
+          </a:fillRef>
+          <a:effectRef idx="1">
+            <a:schemeClr val="dk1"/>
+          </a:effectRef>
+          <a:fontRef idx="minor">
+            <a:schemeClr val="tx1"/>
+          </a:fontRef>
+        </p:style>
+      </p:cxnSp>
+      <p:sp>
+        <p:nvSpPr>
+          <p:cNvPr id="48" name="Rectangle 47"/>
           <p:cNvSpPr/>
           <p:nvPr/>
         </p:nvSpPr>
         <p:spPr>
           <a:xfrm>
-            <a:off x="4936359" y="3933931"/>
-            <a:ext cx="2930895" cy="1186708"/>
+            <a:off x="7151860" y="2165916"/>
+            <a:ext cx="1530197" cy="458504"/>
           </a:xfrm>
           <a:prstGeom prst="rect">
             <a:avLst/>
@@ -4242,158 +4286,32 @@
           </a:fontRef>
         </p:style>
         <p:txBody>
-          <a:bodyPr rtlCol="0" anchor="t"/>
-          <a:lstStyle/>
-          <a:p>
-            <a:r>
-              <a:rPr lang="tr-TR" sz="1000" dirty="0"/>
-              <a:t>- Controller </a:t>
-            </a:r>
-            <a:r>
-              <a:rPr lang="tr-TR" sz="1000" dirty="0" err="1"/>
-              <a:t>controller</a:t>
-            </a:r>
-            <a:endParaRPr lang="tr-TR" sz="1000" dirty="0"/>
-          </a:p>
-          <a:p>
-            <a:r>
-              <a:rPr lang="tr-TR" sz="1000" dirty="0"/>
-              <a:t>- </a:t>
-            </a:r>
-            <a:r>
-              <a:rPr lang="tr-TR" sz="1000" dirty="0" err="1"/>
-              <a:t>int</a:t>
-            </a:r>
-            <a:r>
-              <a:rPr lang="tr-TR" sz="1000" dirty="0"/>
-              <a:t> ID</a:t>
-            </a:r>
-          </a:p>
-          <a:p>
-            <a:r>
-              <a:rPr lang="en-US" sz="1000" dirty="0" smtClean="0">
-                <a:latin typeface="Monaco"/>
+          <a:bodyPr lIns="84902" tIns="42451" rIns="84902" bIns="42451" rtlCol="0" anchor="ctr"/>
+          <a:lstStyle/>
+          <a:p>
+            <a:pPr algn="ctr"/>
+            <a:r>
+              <a:rPr lang="en-US" sz="1050" b="1" dirty="0" smtClean="0">
                 <a:cs typeface="Monaco"/>
               </a:rPr>
-              <a:t>⎯⎯⎯⎯⎯⎯⎯⎯⎯⎯⎯⎯⎯⎯⎯⎯</a:t>
-            </a:r>
-            <a:endParaRPr lang="en-US" sz="1000" dirty="0" smtClean="0">
-              <a:latin typeface="Monaco"/>
+              <a:t>GameBoard</a:t>
+            </a:r>
+            <a:endParaRPr lang="en-US" sz="1050" b="1" dirty="0">
               <a:cs typeface="Monaco"/>
             </a:endParaRPr>
           </a:p>
-          <a:p>
-            <a:r>
-              <a:rPr lang="tr-TR" sz="1000" dirty="0"/>
-              <a:t>+ </a:t>
-            </a:r>
-            <a:r>
-              <a:rPr lang="tr-TR" sz="1000" dirty="0" err="1"/>
-              <a:t>BoardButton</a:t>
-            </a:r>
-            <a:r>
-              <a:rPr lang="tr-TR" sz="1000" dirty="0"/>
-              <a:t>(Controller, </a:t>
-            </a:r>
-            <a:r>
-              <a:rPr lang="tr-TR" sz="1000" dirty="0" err="1"/>
-              <a:t>int</a:t>
-            </a:r>
-            <a:r>
-              <a:rPr lang="tr-TR" sz="1000" dirty="0"/>
-              <a:t> ID):&lt;</a:t>
-            </a:r>
-            <a:r>
-              <a:rPr lang="tr-TR" sz="1000" dirty="0" err="1"/>
-              <a:t>constructor</a:t>
-            </a:r>
-            <a:r>
-              <a:rPr lang="tr-TR" sz="1000" dirty="0"/>
-              <a:t>&gt;</a:t>
-            </a:r>
-          </a:p>
-          <a:p>
-            <a:r>
-              <a:rPr lang="tr-TR" sz="1000" dirty="0"/>
-              <a:t>+ </a:t>
-            </a:r>
-            <a:r>
-              <a:rPr lang="tr-TR" sz="1000" dirty="0" err="1"/>
-              <a:t>setButtonState</a:t>
-            </a:r>
-            <a:r>
-              <a:rPr lang="tr-TR" sz="1000" dirty="0"/>
-              <a:t>(</a:t>
-            </a:r>
-            <a:r>
-              <a:rPr lang="tr-TR" sz="1000" dirty="0" err="1"/>
-              <a:t>boolean</a:t>
-            </a:r>
-            <a:r>
-              <a:rPr lang="tr-TR" sz="1000" dirty="0"/>
-              <a:t> </a:t>
-            </a:r>
-            <a:r>
-              <a:rPr lang="tr-TR" sz="1000" dirty="0" err="1"/>
-              <a:t>state</a:t>
-            </a:r>
-            <a:r>
-              <a:rPr lang="tr-TR" sz="1000" dirty="0"/>
-              <a:t>):</a:t>
-            </a:r>
-            <a:r>
-              <a:rPr lang="tr-TR" sz="1000" dirty="0" err="1"/>
-              <a:t>void</a:t>
-            </a:r>
-            <a:endParaRPr lang="tr-TR" sz="1000" dirty="0"/>
-          </a:p>
-          <a:p>
-            <a:r>
-              <a:rPr lang="tr-TR" sz="1000" dirty="0"/>
-              <a:t>+ </a:t>
-            </a:r>
-            <a:r>
-              <a:rPr lang="tr-TR" sz="1000" dirty="0" err="1"/>
-              <a:t>setButtonText</a:t>
-            </a:r>
-            <a:r>
-              <a:rPr lang="tr-TR" sz="1000" dirty="0"/>
-              <a:t>(</a:t>
-            </a:r>
-            <a:r>
-              <a:rPr lang="tr-TR" sz="1000" dirty="0" err="1"/>
-              <a:t>String</a:t>
-            </a:r>
-            <a:r>
-              <a:rPr lang="tr-TR" sz="1000" dirty="0"/>
-              <a:t> </a:t>
-            </a:r>
-            <a:r>
-              <a:rPr lang="tr-TR" sz="1000" dirty="0" err="1"/>
-              <a:t>buttonText</a:t>
-            </a:r>
-            <a:r>
-              <a:rPr lang="tr-TR" sz="1000" dirty="0"/>
-              <a:t>):</a:t>
-            </a:r>
-            <a:r>
-              <a:rPr lang="tr-TR" sz="1000" dirty="0" err="1"/>
-              <a:t>void</a:t>
-            </a:r>
-            <a:endParaRPr lang="tr-TR" sz="1000" dirty="0"/>
-          </a:p>
-        </p:txBody>
-      </p:sp>
-      <p:sp>
-        <p:nvSpPr>
-          <p:cNvPr id="23" name="Rectangle 22"/>
+        </p:txBody>
+      </p:sp>
+      <p:sp>
+        <p:nvSpPr>
+          <p:cNvPr id="49" name="Rectangle 48"/>
           <p:cNvSpPr/>
           <p:nvPr/>
         </p:nvSpPr>
         <p:spPr>
           <a:xfrm>
-            <a:off x="4936360" y="3459797"/>
-            <a:ext cx="2740104" cy="457200"/>
+            <a:off x="7203458" y="2656577"/>
+            <a:ext cx="1940542" cy="1883836"/>
           </a:xfrm>
           <a:prstGeom prst="rect">
             <a:avLst/>
@@ -4418,34 +4336,60 @@
           </a:fontRef>
         </p:style>
         <p:txBody>
-          <a:bodyPr rtlCol="0" anchor="ctr"/>
-          <a:lstStyle/>
-          <a:p>
-            <a:pPr algn="ctr"/>
-            <a:r>
-              <a:rPr lang="tr-TR" dirty="0" err="1" smtClean="0">
-                <a:latin typeface="Monaco"/>
+          <a:bodyPr lIns="84902" tIns="42451" rIns="84902" bIns="42451" rtlCol="0" anchor="t"/>
+          <a:lstStyle/>
+          <a:p>
+            <a:r>
+              <a:rPr lang="en-US" sz="1050" b="1" dirty="0">
                 <a:cs typeface="Monaco"/>
               </a:rPr>
-              <a:t>BoardButton</a:t>
-            </a:r>
-            <a:endParaRPr lang="tr-TR" dirty="0">
-              <a:latin typeface="Monaco"/>
-              <a:cs typeface="Monaco"/>
-            </a:endParaRPr>
+              <a:t>- JButton[] boardButtons</a:t>
+            </a:r>
+          </a:p>
+          <a:p>
+            <a:r>
+              <a:rPr lang="en-US" sz="1050" b="1" dirty="0">
+                <a:cs typeface="Monaco"/>
+              </a:rPr>
+              <a:t>- Controller controller</a:t>
+            </a:r>
+          </a:p>
+          <a:p>
+            <a:r>
+              <a:rPr lang="en-US" sz="1050" b="1" dirty="0">
+                <a:cs typeface="Monaco"/>
+              </a:rPr>
+              <a:t>⎯⎯⎯⎯⎯⎯⎯⎯⎯⎯⎯⎯⎯⎯</a:t>
+            </a:r>
+          </a:p>
+          <a:p>
+            <a:r>
+              <a:rPr lang="en-US" sz="1050" b="1" dirty="0">
+                <a:cs typeface="Monaco"/>
+              </a:rPr>
+              <a:t>+ GameBoard(Controller): 	&lt;constructor&gt;</a:t>
+            </a:r>
+          </a:p>
+          <a:p>
+            <a:r>
+              <a:rPr lang="en-US" sz="1050" b="1" dirty="0">
+                <a:cs typeface="Monaco"/>
+              </a:rPr>
+              <a:t>- createButtons(): void</a:t>
+            </a:r>
           </a:p>
         </p:txBody>
       </p:sp>
       <p:cxnSp>
         <p:nvCxnSpPr>
-          <p:cNvPr id="24" name="Straight Connector 23"/>
+          <p:cNvPr id="50" name="Straight Connector 49"/>
           <p:cNvCxnSpPr/>
           <p:nvPr/>
         </p:nvCxnSpPr>
         <p:spPr>
           <a:xfrm>
-            <a:off x="4939615" y="3916997"/>
-            <a:ext cx="2736849" cy="0"/>
+            <a:off x="8021019" y="1925856"/>
+            <a:ext cx="2" cy="243640"/>
           </a:xfrm>
           <a:prstGeom prst="line">
             <a:avLst/>
@@ -4469,18 +4413,190 @@
       </p:cxnSp>
       <p:sp>
         <p:nvSpPr>
-          <p:cNvPr id="29" name="Diamond 28"/>
+          <p:cNvPr id="51" name="Rounded Rectangle 50"/>
           <p:cNvSpPr/>
           <p:nvPr/>
         </p:nvSpPr>
         <p:spPr>
           <a:xfrm>
-            <a:off x="3843210" y="3672861"/>
-            <a:ext cx="219126" cy="281517"/>
-          </a:xfrm>
-          <a:prstGeom prst="diamond">
+            <a:off x="533459" y="963199"/>
+            <a:ext cx="1367412" cy="458718"/>
+          </a:xfrm>
+          <a:prstGeom prst="roundRect">
             <a:avLst/>
           </a:prstGeom>
+        </p:spPr>
+        <p:style>
+          <a:lnRef idx="2">
+            <a:schemeClr val="dk1"/>
+          </a:lnRef>
+          <a:fillRef idx="1">
+            <a:schemeClr val="lt1"/>
+          </a:fillRef>
+          <a:effectRef idx="0">
+            <a:schemeClr val="dk1"/>
+          </a:effectRef>
+          <a:fontRef idx="minor">
+            <a:schemeClr val="dk1"/>
+          </a:fontRef>
+        </p:style>
+        <p:txBody>
+          <a:bodyPr lIns="84902" tIns="42451" rIns="84902" bIns="42451" rtlCol="0" anchor="ctr"/>
+          <a:lstStyle/>
+          <a:p>
+            <a:pPr algn="ctr"/>
+            <a:endParaRPr lang="en-US" sz="1050" b="1" dirty="0"/>
+          </a:p>
+        </p:txBody>
+      </p:sp>
+      <p:sp>
+        <p:nvSpPr>
+          <p:cNvPr id="52" name="Rectangle 51"/>
+          <p:cNvSpPr/>
+          <p:nvPr/>
+        </p:nvSpPr>
+        <p:spPr>
+          <a:xfrm>
+            <a:off x="582932" y="979564"/>
+            <a:ext cx="1223813" cy="348509"/>
+          </a:xfrm>
+          <a:prstGeom prst="rect">
+            <a:avLst/>
+          </a:prstGeom>
+          <a:noFill/>
+          <a:ln>
+            <a:noFill/>
+          </a:ln>
+        </p:spPr>
+        <p:style>
+          <a:lnRef idx="2">
+            <a:schemeClr val="dk1"/>
+          </a:lnRef>
+          <a:fillRef idx="1">
+            <a:schemeClr val="lt1"/>
+          </a:fillRef>
+          <a:effectRef idx="0">
+            <a:schemeClr val="dk1"/>
+          </a:effectRef>
+          <a:fontRef idx="minor">
+            <a:schemeClr val="dk1"/>
+          </a:fontRef>
+        </p:style>
+        <p:txBody>
+          <a:bodyPr lIns="84902" tIns="42451" rIns="84902" bIns="42451" rtlCol="0" anchor="ctr"/>
+          <a:lstStyle/>
+          <a:p>
+            <a:pPr algn="ctr"/>
+            <a:r>
+              <a:rPr lang="en-US" sz="1050" b="1" dirty="0" smtClean="0">
+                <a:cs typeface="Monaco"/>
+              </a:rPr>
+              <a:t>JButton</a:t>
+            </a:r>
+            <a:endParaRPr lang="en-US" sz="1050" b="1" dirty="0">
+              <a:cs typeface="Monaco"/>
+            </a:endParaRPr>
+          </a:p>
+        </p:txBody>
+      </p:sp>
+      <p:sp>
+        <p:nvSpPr>
+          <p:cNvPr id="53" name="Rectangle 52"/>
+          <p:cNvSpPr/>
+          <p:nvPr/>
+        </p:nvSpPr>
+        <p:spPr>
+          <a:xfrm>
+            <a:off x="499317" y="590320"/>
+            <a:ext cx="1435696" cy="371211"/>
+          </a:xfrm>
+          <a:prstGeom prst="rect">
+            <a:avLst/>
+          </a:prstGeom>
+          <a:noFill/>
+          <a:ln>
+            <a:noFill/>
+          </a:ln>
+        </p:spPr>
+        <p:style>
+          <a:lnRef idx="2">
+            <a:schemeClr val="dk1"/>
+          </a:lnRef>
+          <a:fillRef idx="1">
+            <a:schemeClr val="lt1"/>
+          </a:fillRef>
+          <a:effectRef idx="0">
+            <a:schemeClr val="dk1"/>
+          </a:effectRef>
+          <a:fontRef idx="minor">
+            <a:schemeClr val="dk1"/>
+          </a:fontRef>
+        </p:style>
+        <p:txBody>
+          <a:bodyPr lIns="84902" tIns="42451" rIns="84902" bIns="42451" rtlCol="0" anchor="ctr"/>
+          <a:lstStyle/>
+          <a:p>
+            <a:pPr algn="ctr"/>
+            <a:r>
+              <a:rPr lang="en-US" sz="1050" b="1" dirty="0" smtClean="0">
+                <a:cs typeface="Monaco"/>
+              </a:rPr>
+              <a:t>&lt;&lt;interface&gt;&gt;</a:t>
+            </a:r>
+            <a:endParaRPr lang="en-US" sz="1050" b="1" dirty="0">
+              <a:cs typeface="Monaco"/>
+            </a:endParaRPr>
+          </a:p>
+        </p:txBody>
+      </p:sp>
+      <p:cxnSp>
+        <p:nvCxnSpPr>
+          <p:cNvPr id="54" name="Straight Connector 53"/>
+          <p:cNvCxnSpPr>
+            <a:stCxn id="55" idx="3"/>
+          </p:cNvCxnSpPr>
+          <p:nvPr/>
+        </p:nvCxnSpPr>
+        <p:spPr>
+          <a:xfrm flipH="1">
+            <a:off x="1200931" y="1620508"/>
+            <a:ext cx="1874" cy="653475"/>
+          </a:xfrm>
+          <a:prstGeom prst="line">
+            <a:avLst/>
+          </a:prstGeom>
+          <a:effectLst/>
+        </p:spPr>
+        <p:style>
+          <a:lnRef idx="2">
+            <a:schemeClr val="dk1"/>
+          </a:lnRef>
+          <a:fillRef idx="0">
+            <a:schemeClr val="dk1"/>
+          </a:fillRef>
+          <a:effectRef idx="1">
+            <a:schemeClr val="dk1"/>
+          </a:effectRef>
+          <a:fontRef idx="minor">
+            <a:schemeClr val="tx1"/>
+          </a:fontRef>
+        </p:style>
+      </p:cxnSp>
+      <p:sp>
+        <p:nvSpPr>
+          <p:cNvPr id="55" name="Isosceles Triangle 54"/>
+          <p:cNvSpPr/>
+          <p:nvPr/>
+        </p:nvSpPr>
+        <p:spPr>
+          <a:xfrm>
+            <a:off x="1096667" y="1416708"/>
+            <a:ext cx="212275" cy="203800"/>
+          </a:xfrm>
+          <a:prstGeom prst="triangle">
+            <a:avLst/>
+          </a:prstGeom>
+          <a:noFill/>
         </p:spPr>
         <p:style>
           <a:lnRef idx="2">
@@ -4499,26 +4615,62 @@
           </a:fontRef>
         </p:style>
         <p:txBody>
-          <a:bodyPr rtlCol="0" anchor="ctr"/>
+          <a:bodyPr lIns="84902" tIns="42451" rIns="84902" bIns="42451" spcCol="0" rtlCol="0" anchor="ctr"/>
           <a:lstStyle/>
           <a:p>
             <a:pPr algn="ctr"/>
-            <a:endParaRPr lang="en-US"/>
+            <a:endParaRPr lang="en-US" sz="1050" b="1" dirty="0"/>
+          </a:p>
+        </p:txBody>
+      </p:sp>
+      <p:sp>
+        <p:nvSpPr>
+          <p:cNvPr id="56" name="Rounded Rectangle 55"/>
+          <p:cNvSpPr/>
+          <p:nvPr/>
+        </p:nvSpPr>
+        <p:spPr>
+          <a:xfrm>
+            <a:off x="215668" y="2083321"/>
+            <a:ext cx="2051805" cy="2363265"/>
+          </a:xfrm>
+          <a:prstGeom prst="roundRect">
+            <a:avLst/>
+          </a:prstGeom>
+        </p:spPr>
+        <p:style>
+          <a:lnRef idx="2">
+            <a:schemeClr val="dk1"/>
+          </a:lnRef>
+          <a:fillRef idx="1">
+            <a:schemeClr val="lt1"/>
+          </a:fillRef>
+          <a:effectRef idx="0">
+            <a:schemeClr val="dk1"/>
+          </a:effectRef>
+          <a:fontRef idx="minor">
+            <a:schemeClr val="dk1"/>
+          </a:fontRef>
+        </p:style>
+        <p:txBody>
+          <a:bodyPr lIns="84902" tIns="42451" rIns="84902" bIns="42451" rtlCol="0" anchor="ctr"/>
+          <a:lstStyle/>
+          <a:p>
+            <a:pPr algn="ctr"/>
+            <a:endParaRPr lang="en-US" sz="1050" b="1" dirty="0"/>
           </a:p>
         </p:txBody>
       </p:sp>
       <p:cxnSp>
         <p:nvCxnSpPr>
-          <p:cNvPr id="30" name="Straight Connector 29"/>
-          <p:cNvCxnSpPr>
-            <a:stCxn id="29" idx="3"/>
-          </p:cNvCxnSpPr>
+          <p:cNvPr id="57" name="Straight Connector 56"/>
+          <p:cNvCxnSpPr/>
           <p:nvPr/>
         </p:nvCxnSpPr>
         <p:spPr>
           <a:xfrm>
-            <a:off x="4062336" y="3813620"/>
-            <a:ext cx="877279" cy="0"/>
+            <a:off x="215668" y="2529100"/>
+            <a:ext cx="2065672" cy="0"/>
           </a:xfrm>
           <a:prstGeom prst="line">
             <a:avLst/>
@@ -4542,49 +4694,252 @@
       </p:cxnSp>
       <p:sp>
         <p:nvSpPr>
-          <p:cNvPr id="31" name="TextBox 30"/>
-          <p:cNvSpPr txBox="1"/>
+          <p:cNvPr id="62" name="Rectangle 61"/>
+          <p:cNvSpPr/>
           <p:nvPr/>
         </p:nvSpPr>
         <p:spPr>
           <a:xfrm>
-            <a:off x="3938460" y="3457960"/>
-            <a:ext cx="254000" cy="369332"/>
+            <a:off x="505712" y="2134081"/>
+            <a:ext cx="1456701" cy="347653"/>
           </a:xfrm>
           <a:prstGeom prst="rect">
             <a:avLst/>
           </a:prstGeom>
           <a:noFill/>
-        </p:spPr>
-        <p:txBody>
-          <a:bodyPr wrap="square" rtlCol="0">
-            <a:spAutoFit/>
-          </a:bodyPr>
-          <a:lstStyle/>
-          <a:p>
-            <a:r>
-              <a:rPr lang="en-US" dirty="0" smtClean="0"/>
-              <a:t>1</a:t>
-            </a:r>
-            <a:endParaRPr lang="en-US" dirty="0"/>
-          </a:p>
-        </p:txBody>
-      </p:sp>
-      <p:sp>
-        <p:nvSpPr>
-          <p:cNvPr id="32" name="TextBox 31"/>
-          <p:cNvSpPr txBox="1"/>
+          <a:ln>
+            <a:noFill/>
+          </a:ln>
+        </p:spPr>
+        <p:style>
+          <a:lnRef idx="2">
+            <a:schemeClr val="dk1"/>
+          </a:lnRef>
+          <a:fillRef idx="1">
+            <a:schemeClr val="lt1"/>
+          </a:fillRef>
+          <a:effectRef idx="0">
+            <a:schemeClr val="dk1"/>
+          </a:effectRef>
+          <a:fontRef idx="minor">
+            <a:schemeClr val="dk1"/>
+          </a:fontRef>
+        </p:style>
+        <p:txBody>
+          <a:bodyPr lIns="84902" tIns="42451" rIns="84902" bIns="42451" rtlCol="0" anchor="ctr"/>
+          <a:lstStyle/>
+          <a:p>
+            <a:pPr algn="ctr"/>
+            <a:r>
+              <a:rPr lang="en-US" sz="1050" b="1" dirty="0" smtClean="0">
+                <a:cs typeface="Monaco"/>
+              </a:rPr>
+              <a:t>BoardButton</a:t>
+            </a:r>
+            <a:endParaRPr lang="en-US" sz="1050" b="1" dirty="0">
+              <a:cs typeface="Monaco"/>
+            </a:endParaRPr>
+          </a:p>
+        </p:txBody>
+      </p:sp>
+      <p:sp>
+        <p:nvSpPr>
+          <p:cNvPr id="63" name="Rectangle 62"/>
+          <p:cNvSpPr/>
           <p:nvPr/>
         </p:nvSpPr>
         <p:spPr>
           <a:xfrm>
-            <a:off x="4663189" y="3451227"/>
-            <a:ext cx="244545" cy="369332"/>
+            <a:off x="215668" y="2594032"/>
+            <a:ext cx="2129262" cy="1929884"/>
           </a:xfrm>
           <a:prstGeom prst="rect">
             <a:avLst/>
           </a:prstGeom>
           <a:noFill/>
+          <a:ln>
+            <a:noFill/>
+          </a:ln>
+        </p:spPr>
+        <p:style>
+          <a:lnRef idx="2">
+            <a:schemeClr val="dk1"/>
+          </a:lnRef>
+          <a:fillRef idx="1">
+            <a:schemeClr val="lt1"/>
+          </a:fillRef>
+          <a:effectRef idx="0">
+            <a:schemeClr val="dk1"/>
+          </a:effectRef>
+          <a:fontRef idx="minor">
+            <a:schemeClr val="dk1"/>
+          </a:fontRef>
+        </p:style>
+        <p:txBody>
+          <a:bodyPr lIns="84902" tIns="42451" rIns="84902" bIns="42451" rtlCol="0" anchor="t"/>
+          <a:lstStyle/>
+          <a:p>
+            <a:r>
+              <a:rPr lang="en-US" sz="1050" b="1" dirty="0">
+                <a:cs typeface="Monaco"/>
+              </a:rPr>
+              <a:t>- int buttonID</a:t>
+            </a:r>
+          </a:p>
+          <a:p>
+            <a:r>
+              <a:rPr lang="en-US" sz="1050" b="1" dirty="0">
+                <a:cs typeface="Monaco"/>
+              </a:rPr>
+              <a:t>- Controller controller</a:t>
+            </a:r>
+          </a:p>
+          <a:p>
+            <a:r>
+              <a:rPr lang="en-US" sz="1050" b="1" dirty="0">
+                <a:cs typeface="Monaco"/>
+              </a:rPr>
+              <a:t>⎯⎯⎯⎯⎯⎯⎯⎯⎯⎯⎯⎯⎯⎯⎯⎯</a:t>
+            </a:r>
+          </a:p>
+          <a:p>
+            <a:r>
+              <a:rPr lang="en-US" sz="1050" b="1" dirty="0">
+                <a:cs typeface="Monaco"/>
+              </a:rPr>
+              <a:t>+ BoardButton(</a:t>
+            </a:r>
+            <a:r>
+              <a:rPr lang="en-US" sz="1050" b="1" dirty="0" smtClean="0">
+                <a:cs typeface="Monaco"/>
+              </a:rPr>
+              <a:t>Controller, </a:t>
+            </a:r>
+            <a:r>
+              <a:rPr lang="en-US" sz="1050" b="1" dirty="0" err="1" smtClean="0">
+                <a:cs typeface="Monaco"/>
+              </a:rPr>
+              <a:t>int</a:t>
+            </a:r>
+            <a:r>
+              <a:rPr lang="en-US" sz="1050" b="1" dirty="0" smtClean="0">
+                <a:cs typeface="Monaco"/>
+              </a:rPr>
+              <a:t> 	id): &lt;</a:t>
+            </a:r>
+            <a:r>
+              <a:rPr lang="en-US" sz="1050" b="1" dirty="0">
+                <a:cs typeface="Monaco"/>
+              </a:rPr>
+              <a:t>constructor&gt;</a:t>
+            </a:r>
+          </a:p>
+          <a:p>
+            <a:r>
+              <a:rPr lang="en-US" sz="1050" b="1" dirty="0">
+                <a:cs typeface="Monaco"/>
+              </a:rPr>
+              <a:t>+ setButtonState(boolean 	state): void</a:t>
+            </a:r>
+          </a:p>
+          <a:p>
+            <a:r>
+              <a:rPr lang="en-US" sz="1050" b="1" dirty="0">
+                <a:cs typeface="Monaco"/>
+              </a:rPr>
+              <a:t>+ setButtonText(String text): 	void</a:t>
+            </a:r>
+          </a:p>
+        </p:txBody>
+      </p:sp>
+      <p:sp>
+        <p:nvSpPr>
+          <p:cNvPr id="68" name="Diamond 67"/>
+          <p:cNvSpPr/>
+          <p:nvPr/>
+        </p:nvSpPr>
+        <p:spPr>
+          <a:xfrm>
+            <a:off x="2710781" y="2246854"/>
+            <a:ext cx="251911" cy="255171"/>
+          </a:xfrm>
+          <a:prstGeom prst="diamond">
+            <a:avLst/>
+          </a:prstGeom>
+        </p:spPr>
+        <p:style>
+          <a:lnRef idx="2">
+            <a:schemeClr val="dk1">
+              <a:shade val="50000"/>
+            </a:schemeClr>
+          </a:lnRef>
+          <a:fillRef idx="1">
+            <a:schemeClr val="dk1"/>
+          </a:fillRef>
+          <a:effectRef idx="0">
+            <a:schemeClr val="dk1"/>
+          </a:effectRef>
+          <a:fontRef idx="minor">
+            <a:schemeClr val="lt1"/>
+          </a:fontRef>
+        </p:style>
+        <p:txBody>
+          <a:bodyPr rtlCol="0" anchor="ctr"/>
+          <a:lstStyle/>
+          <a:p>
+            <a:pPr algn="ctr"/>
+            <a:endParaRPr lang="en-US" sz="1050" b="1"/>
+          </a:p>
+        </p:txBody>
+      </p:sp>
+      <p:cxnSp>
+        <p:nvCxnSpPr>
+          <p:cNvPr id="71" name="Straight Connector 70"/>
+          <p:cNvCxnSpPr>
+            <a:endCxn id="68" idx="1"/>
+          </p:cNvCxnSpPr>
+          <p:nvPr/>
+        </p:nvCxnSpPr>
+        <p:spPr>
+          <a:xfrm>
+            <a:off x="2267235" y="2370207"/>
+            <a:ext cx="443546" cy="4233"/>
+          </a:xfrm>
+          <a:prstGeom prst="line">
+            <a:avLst/>
+          </a:prstGeom>
+          <a:effectLst/>
+        </p:spPr>
+        <p:style>
+          <a:lnRef idx="2">
+            <a:schemeClr val="dk1"/>
+          </a:lnRef>
+          <a:fillRef idx="0">
+            <a:schemeClr val="dk1"/>
+          </a:fillRef>
+          <a:effectRef idx="1">
+            <a:schemeClr val="dk1"/>
+          </a:effectRef>
+          <a:fontRef idx="minor">
+            <a:schemeClr val="tx1"/>
+          </a:fontRef>
+        </p:style>
+      </p:cxnSp>
+      <p:sp>
+        <p:nvSpPr>
+          <p:cNvPr id="72" name="TextBox 71"/>
+          <p:cNvSpPr txBox="1"/>
+          <p:nvPr/>
+        </p:nvSpPr>
+        <p:spPr>
+          <a:xfrm>
+            <a:off x="2820116" y="1974497"/>
+            <a:ext cx="251160" cy="253916"/>
+          </a:xfrm>
+          <a:prstGeom prst="rect">
+            <a:avLst/>
+          </a:prstGeom>
+          <a:noFill/>
         </p:spPr>
         <p:txBody>
           <a:bodyPr wrap="square" rtlCol="0">
@@ -4593,17 +4948,47 @@
           <a:lstStyle/>
           <a:p>
             <a:r>
-              <a:rPr lang="tr-TR" dirty="0"/>
+              <a:rPr lang="en-US" sz="1050" b="1" dirty="0" smtClean="0"/>
+              <a:t>1</a:t>
+            </a:r>
+            <a:endParaRPr lang="en-US" sz="1050" b="1" dirty="0"/>
+          </a:p>
+        </p:txBody>
+      </p:sp>
+      <p:sp>
+        <p:nvSpPr>
+          <p:cNvPr id="73" name="TextBox 72"/>
+          <p:cNvSpPr txBox="1"/>
+          <p:nvPr/>
+        </p:nvSpPr>
+        <p:spPr>
+          <a:xfrm>
+            <a:off x="2162000" y="1963569"/>
+            <a:ext cx="238679" cy="253916"/>
+          </a:xfrm>
+          <a:prstGeom prst="rect">
+            <a:avLst/>
+          </a:prstGeom>
+          <a:noFill/>
+        </p:spPr>
+        <p:txBody>
+          <a:bodyPr wrap="square" rtlCol="0">
+            <a:spAutoFit/>
+          </a:bodyPr>
+          <a:lstStyle/>
+          <a:p>
+            <a:r>
+              <a:rPr lang="tr-TR" sz="1050" b="1" dirty="0"/>
               <a:t>n</a:t>
             </a:r>
-            <a:endParaRPr lang="en-US" dirty="0"/>
+            <a:endParaRPr lang="en-US" sz="1050" b="1" dirty="0"/>
           </a:p>
         </p:txBody>
       </p:sp>
     </p:spTree>
     <p:extLst>
       <p:ext uri="{BB962C8B-B14F-4D97-AF65-F5344CB8AC3E}">
-        <p14:creationId xmlns:p14="http://schemas.microsoft.com/office/powerpoint/2010/main" val="4243189787"/>
+        <p14:creationId xmlns:p14="http://schemas.microsoft.com/office/powerpoint/2010/main" val="4212330594"/>
       </p:ext>
     </p:extLst>
   </p:cSld>

</xml_diff>